<commit_message>
se eliminan notas de prueba en primer y segundo trimestre
</commit_message>
<xml_diff>
--- a/proyecto_formativo/documentacion/primer_trimestre/1_Presentación_Sustentacion.pptx
+++ b/proyecto_formativo/documentacion/primer_trimestre/1_Presentación_Sustentacion.pptx
@@ -22,10 +22,8 @@
     <p:sldId id="282" r:id="rId16"/>
     <p:sldId id="280" r:id="rId17"/>
     <p:sldId id="283" r:id="rId18"/>
-    <p:sldId id="284" r:id="rId19"/>
-    <p:sldId id="285" r:id="rId20"/>
-    <p:sldId id="267" r:id="rId21"/>
-    <p:sldId id="262" r:id="rId22"/>
+    <p:sldId id="267" r:id="rId19"/>
+    <p:sldId id="262" r:id="rId20"/>
   </p:sldIdLst>
   <p:sldSz cx="9144000" cy="5143500" type="screen16x9"/>
   <p:notesSz cx="6858000" cy="9144000"/>
@@ -312,7 +310,7 @@
           <a:p>
             <a:fld id="{B3030C24-9424-B24A-8613-79990C3AA492}" type="datetimeFigureOut">
               <a:rPr lang="es-ES" smtClean="0"/>
-              <a:t>24/03/2021</a:t>
+              <a:t>29/03/2021</a:t>
             </a:fld>
             <a:endParaRPr lang="es-ES"/>
           </a:p>
@@ -492,7 +490,7 @@
           <a:p>
             <a:fld id="{B3030C24-9424-B24A-8613-79990C3AA492}" type="datetimeFigureOut">
               <a:rPr lang="es-ES" smtClean="0"/>
-              <a:t>24/03/2021</a:t>
+              <a:t>29/03/2021</a:t>
             </a:fld>
             <a:endParaRPr lang="es-ES"/>
           </a:p>
@@ -1129,7 +1127,7 @@
           <a:p>
             <a:fld id="{B3030C24-9424-B24A-8613-79990C3AA492}" type="datetimeFigureOut">
               <a:rPr lang="es-ES" smtClean="0"/>
-              <a:t>24/03/2021</a:t>
+              <a:t>29/03/2021</a:t>
             </a:fld>
             <a:endParaRPr lang="es-ES"/>
           </a:p>
@@ -1382,7 +1380,7 @@
           <a:p>
             <a:fld id="{B3030C24-9424-B24A-8613-79990C3AA492}" type="datetimeFigureOut">
               <a:rPr lang="es-ES" smtClean="0"/>
-              <a:t>24/03/2021</a:t>
+              <a:t>29/03/2021</a:t>
             </a:fld>
             <a:endParaRPr lang="es-ES"/>
           </a:p>
@@ -1595,7 +1593,7 @@
           <a:p>
             <a:fld id="{B3030C24-9424-B24A-8613-79990C3AA492}" type="datetimeFigureOut">
               <a:rPr lang="es-ES" smtClean="0"/>
-              <a:t>24/03/2021</a:t>
+              <a:t>29/03/2021</a:t>
             </a:fld>
             <a:endParaRPr lang="es-ES"/>
           </a:p>
@@ -3669,8 +3667,8 @@
         </p:nvSpPr>
         <p:spPr>
           <a:xfrm>
-            <a:off x="249914" y="1111627"/>
-            <a:ext cx="5268384" cy="3539430"/>
+            <a:off x="181675" y="1035427"/>
+            <a:ext cx="4068592" cy="2800767"/>
           </a:xfrm>
           <a:prstGeom prst="rect">
             <a:avLst/>
@@ -3694,14 +3692,6 @@
               </a:rPr>
               <a:t>DELIMITACIÓN</a:t>
             </a:r>
-            <a:endParaRPr lang="es-ES_tradnl" sz="1600" dirty="0">
-              <a:solidFill>
-                <a:schemeClr val="tx1">
-                  <a:lumMod val="75000"/>
-                  <a:lumOff val="25000"/>
-                </a:schemeClr>
-              </a:solidFill>
-            </a:endParaRPr>
           </a:p>
           <a:p>
             <a:pPr algn="just"/>
@@ -3763,20 +3753,6 @@
                 </a:schemeClr>
               </a:solidFill>
             </a:endParaRPr>
-          </a:p>
-          <a:p>
-            <a:pPr algn="just"/>
-            <a:r>
-              <a:rPr lang="es-ES_tradnl" sz="1600" dirty="0">
-                <a:solidFill>
-                  <a:schemeClr val="tx1">
-                    <a:lumMod val="75000"/>
-                    <a:lumOff val="25000"/>
-                  </a:schemeClr>
-                </a:solidFill>
-              </a:rPr>
-              <a:t>En el primer trimestre se entregara, la presentación del proyecto, el levantamiento de información, diagrama de procesos, preliminar inventario, formulación del proyecto y el IEEE830.</a:t>
-            </a:r>
           </a:p>
           <a:p>
             <a:pPr marL="285750" indent="-285750">
@@ -3847,7 +3823,7 @@
         </p:nvSpPr>
         <p:spPr>
           <a:xfrm>
-            <a:off x="382867" y="1395549"/>
+            <a:off x="272801" y="1349830"/>
             <a:ext cx="718487" cy="45719"/>
           </a:xfrm>
           <a:prstGeom prst="rect">
@@ -3884,12 +3860,311 @@
           </a:p>
         </p:txBody>
       </p:sp>
+      <p:sp>
+        <p:nvSpPr>
+          <p:cNvPr id="9" name="Rectángulo 8">
+            <a:extLst>
+              <a:ext uri="{FF2B5EF4-FFF2-40B4-BE49-F238E27FC236}">
+                <a16:creationId xmlns:a16="http://schemas.microsoft.com/office/drawing/2014/main" id="{6EF37200-577B-4342-A97C-3E73FE9965D7}"/>
+              </a:ext>
+            </a:extLst>
+          </p:cNvPr>
+          <p:cNvSpPr/>
+          <p:nvPr/>
+        </p:nvSpPr>
+        <p:spPr>
+          <a:xfrm>
+            <a:off x="4893735" y="1369780"/>
+            <a:ext cx="3801533" cy="4278094"/>
+          </a:xfrm>
+          <a:prstGeom prst="rect">
+            <a:avLst/>
+          </a:prstGeom>
+        </p:spPr>
+        <p:txBody>
+          <a:bodyPr wrap="square">
+            <a:spAutoFit/>
+          </a:bodyPr>
+          <a:lstStyle/>
+          <a:p>
+            <a:pPr algn="just"/>
+            <a:r>
+              <a:rPr lang="es-ES_tradnl" sz="1600" b="1" dirty="0">
+                <a:solidFill>
+                  <a:schemeClr val="tx1">
+                    <a:lumMod val="75000"/>
+                    <a:lumOff val="25000"/>
+                  </a:schemeClr>
+                </a:solidFill>
+              </a:rPr>
+              <a:t>Primer trimestre</a:t>
+            </a:r>
+          </a:p>
+          <a:p>
+            <a:pPr marL="285750" indent="-285750" algn="just">
+              <a:buFont typeface="Arial" panose="020B0604020202020204" pitchFamily="34" charset="0"/>
+              <a:buChar char="•"/>
+            </a:pPr>
+            <a:r>
+              <a:rPr lang="es-ES_tradnl" sz="1600" dirty="0">
+                <a:solidFill>
+                  <a:schemeClr val="tx1">
+                    <a:lumMod val="75000"/>
+                    <a:lumOff val="25000"/>
+                  </a:schemeClr>
+                </a:solidFill>
+              </a:rPr>
+              <a:t>Presentación de proyecto</a:t>
+            </a:r>
+          </a:p>
+          <a:p>
+            <a:pPr marL="285750" indent="-285750" algn="just">
+              <a:buFont typeface="Arial" panose="020B0604020202020204" pitchFamily="34" charset="0"/>
+              <a:buChar char="•"/>
+            </a:pPr>
+            <a:r>
+              <a:rPr lang="es-ES_tradnl" sz="1600" dirty="0">
+                <a:solidFill>
+                  <a:schemeClr val="tx1">
+                    <a:lumMod val="75000"/>
+                    <a:lumOff val="25000"/>
+                  </a:schemeClr>
+                </a:solidFill>
+              </a:rPr>
+              <a:t>Levantamiento de información</a:t>
+            </a:r>
+          </a:p>
+          <a:p>
+            <a:pPr marL="285750" indent="-285750" algn="just">
+              <a:buFont typeface="Arial" panose="020B0604020202020204" pitchFamily="34" charset="0"/>
+              <a:buChar char="•"/>
+            </a:pPr>
+            <a:r>
+              <a:rPr lang="es-ES_tradnl" sz="1600" dirty="0">
+                <a:solidFill>
+                  <a:schemeClr val="tx1">
+                    <a:lumMod val="75000"/>
+                    <a:lumOff val="25000"/>
+                  </a:schemeClr>
+                </a:solidFill>
+              </a:rPr>
+              <a:t>Diagrama de procesos</a:t>
+            </a:r>
+          </a:p>
+          <a:p>
+            <a:pPr marL="285750" indent="-285750" algn="just">
+              <a:buFont typeface="Arial" panose="020B0604020202020204" pitchFamily="34" charset="0"/>
+              <a:buChar char="•"/>
+            </a:pPr>
+            <a:r>
+              <a:rPr lang="es-ES_tradnl" sz="1600" dirty="0">
+                <a:solidFill>
+                  <a:schemeClr val="tx1">
+                    <a:lumMod val="75000"/>
+                    <a:lumOff val="25000"/>
+                  </a:schemeClr>
+                </a:solidFill>
+              </a:rPr>
+              <a:t>Preliminar inventario</a:t>
+            </a:r>
+          </a:p>
+          <a:p>
+            <a:pPr marL="285750" indent="-285750" algn="just">
+              <a:buFont typeface="Arial" panose="020B0604020202020204" pitchFamily="34" charset="0"/>
+              <a:buChar char="•"/>
+            </a:pPr>
+            <a:r>
+              <a:rPr lang="es-ES_tradnl" sz="1600" dirty="0">
+                <a:solidFill>
+                  <a:schemeClr val="tx1">
+                    <a:lumMod val="75000"/>
+                    <a:lumOff val="25000"/>
+                  </a:schemeClr>
+                </a:solidFill>
+              </a:rPr>
+              <a:t>Formulación del proyecto</a:t>
+            </a:r>
+          </a:p>
+          <a:p>
+            <a:pPr marL="285750" indent="-285750" algn="just">
+              <a:buFont typeface="Arial" panose="020B0604020202020204" pitchFamily="34" charset="0"/>
+              <a:buChar char="•"/>
+            </a:pPr>
+            <a:r>
+              <a:rPr lang="es-ES_tradnl" sz="1600" dirty="0">
+                <a:solidFill>
+                  <a:schemeClr val="tx1">
+                    <a:lumMod val="75000"/>
+                    <a:lumOff val="25000"/>
+                  </a:schemeClr>
+                </a:solidFill>
+              </a:rPr>
+              <a:t>IEEE830</a:t>
+            </a:r>
+          </a:p>
+          <a:p>
+            <a:pPr marL="285750" indent="-285750" algn="just">
+              <a:buFont typeface="Arial" panose="020B0604020202020204" pitchFamily="34" charset="0"/>
+              <a:buChar char="•"/>
+            </a:pPr>
+            <a:endParaRPr lang="es-ES_tradnl" sz="1600" dirty="0">
+              <a:solidFill>
+                <a:schemeClr val="tx1">
+                  <a:lumMod val="75000"/>
+                  <a:lumOff val="25000"/>
+                </a:schemeClr>
+              </a:solidFill>
+            </a:endParaRPr>
+          </a:p>
+          <a:p>
+            <a:pPr algn="just"/>
+            <a:r>
+              <a:rPr lang="es-ES_tradnl" sz="1600" b="1" dirty="0">
+                <a:solidFill>
+                  <a:schemeClr val="tx1">
+                    <a:lumMod val="75000"/>
+                    <a:lumOff val="25000"/>
+                  </a:schemeClr>
+                </a:solidFill>
+              </a:rPr>
+              <a:t>Segundo trimestre</a:t>
+            </a:r>
+          </a:p>
+          <a:p>
+            <a:pPr marL="285750" indent="-285750" algn="just">
+              <a:buFont typeface="Arial" panose="020B0604020202020204" pitchFamily="34" charset="0"/>
+              <a:buChar char="•"/>
+            </a:pPr>
+            <a:r>
+              <a:rPr lang="es-ES_tradnl" sz="1600" dirty="0">
+                <a:solidFill>
+                  <a:schemeClr val="tx1">
+                    <a:lumMod val="75000"/>
+                    <a:lumOff val="25000"/>
+                  </a:schemeClr>
+                </a:solidFill>
+              </a:rPr>
+              <a:t>Diagrama casos de uso</a:t>
+            </a:r>
+          </a:p>
+          <a:p>
+            <a:pPr marL="285750" indent="-285750" algn="just">
+              <a:buFont typeface="Arial" panose="020B0604020202020204" pitchFamily="34" charset="0"/>
+              <a:buChar char="•"/>
+            </a:pPr>
+            <a:r>
+              <a:rPr lang="es-ES_tradnl" sz="1600" dirty="0">
+                <a:solidFill>
+                  <a:schemeClr val="tx1">
+                    <a:lumMod val="75000"/>
+                    <a:lumOff val="25000"/>
+                  </a:schemeClr>
+                </a:solidFill>
+              </a:rPr>
+              <a:t>Casos de uso extendido</a:t>
+            </a:r>
+          </a:p>
+          <a:p>
+            <a:pPr marL="285750" indent="-285750" algn="just">
+              <a:buFont typeface="Arial" panose="020B0604020202020204" pitchFamily="34" charset="0"/>
+              <a:buChar char="•"/>
+            </a:pPr>
+            <a:r>
+              <a:rPr lang="es-ES_tradnl" sz="1600" dirty="0">
+                <a:solidFill>
+                  <a:schemeClr val="tx1">
+                    <a:lumMod val="75000"/>
+                    <a:lumOff val="25000"/>
+                  </a:schemeClr>
+                </a:solidFill>
+              </a:rPr>
+              <a:t>Modelo entidad relación</a:t>
+            </a:r>
+          </a:p>
+          <a:p>
+            <a:pPr marL="285750" indent="-285750" algn="just">
+              <a:buFont typeface="Arial" panose="020B0604020202020204" pitchFamily="34" charset="0"/>
+              <a:buChar char="•"/>
+            </a:pPr>
+            <a:r>
+              <a:rPr lang="es-ES_tradnl" sz="1600" dirty="0">
+                <a:solidFill>
+                  <a:schemeClr val="tx1">
+                    <a:lumMod val="75000"/>
+                    <a:lumOff val="25000"/>
+                  </a:schemeClr>
+                </a:solidFill>
+              </a:rPr>
+              <a:t>Diccionario de datos</a:t>
+            </a:r>
+          </a:p>
+          <a:p>
+            <a:pPr marL="285750" indent="-285750" algn="just">
+              <a:buFont typeface="Arial" panose="020B0604020202020204" pitchFamily="34" charset="0"/>
+              <a:buChar char="•"/>
+            </a:pPr>
+            <a:r>
+              <a:rPr lang="es-ES_tradnl" sz="1600" dirty="0">
+                <a:solidFill>
+                  <a:schemeClr val="tx1">
+                    <a:lumMod val="75000"/>
+                    <a:lumOff val="25000"/>
+                  </a:schemeClr>
+                </a:solidFill>
+              </a:rPr>
+              <a:t>Cronograma de actividades</a:t>
+            </a:r>
+          </a:p>
+          <a:p>
+            <a:pPr marL="285750" indent="-285750" algn="just">
+              <a:buFont typeface="Arial" panose="020B0604020202020204" pitchFamily="34" charset="0"/>
+              <a:buChar char="•"/>
+            </a:pPr>
+            <a:r>
+              <a:rPr lang="es-ES_tradnl" sz="1600" dirty="0">
+                <a:solidFill>
+                  <a:schemeClr val="tx1">
+                    <a:lumMod val="75000"/>
+                    <a:lumOff val="25000"/>
+                  </a:schemeClr>
+                </a:solidFill>
+              </a:rPr>
+              <a:t>Presupuesto y personal</a:t>
+            </a:r>
+          </a:p>
+          <a:p>
+            <a:pPr algn="just"/>
+            <a:endParaRPr lang="es-ES_tradnl" sz="1600" dirty="0">
+              <a:solidFill>
+                <a:schemeClr val="tx1">
+                  <a:lumMod val="75000"/>
+                  <a:lumOff val="25000"/>
+                </a:schemeClr>
+              </a:solidFill>
+            </a:endParaRPr>
+          </a:p>
+          <a:p>
+            <a:pPr marL="285750" indent="-285750">
+              <a:buFont typeface="Arial" panose="020B0604020202020204" pitchFamily="34" charset="0"/>
+              <a:buChar char="•"/>
+            </a:pPr>
+            <a:endParaRPr lang="es-ES" sz="1600" dirty="0">
+              <a:solidFill>
+                <a:schemeClr val="tx1">
+                  <a:lumMod val="75000"/>
+                  <a:lumOff val="25000"/>
+                </a:schemeClr>
+              </a:solidFill>
+            </a:endParaRPr>
+          </a:p>
+        </p:txBody>
+      </p:sp>
       <p:pic>
         <p:nvPicPr>
-          <p:cNvPr id="11266" name="Picture 2" descr="Ilustración De Dibujos Animados De Reloj Despertador Nervioso Control De  Tiempo Ilustraciones Vectoriales, Clip Art Vectorizado Libre De Derechos.  Image 81940880.">
+          <p:cNvPr id="1028" name="Picture 4" descr="Last Chances To Apply For Funding - Organización En El Tiempo Dibujos -  Free Transparent PNG Clipart Images Download">
             <a:extLst>
               <a:ext uri="{FF2B5EF4-FFF2-40B4-BE49-F238E27FC236}">
-                <a16:creationId xmlns:a16="http://schemas.microsoft.com/office/drawing/2014/main" id="{640FE6BE-D077-45D4-9D5F-36922FE88AB0}"/>
+                <a16:creationId xmlns:a16="http://schemas.microsoft.com/office/drawing/2014/main" id="{A918DBEF-6C2B-4E8C-8AED-046BB921FAD1}"/>
               </a:ext>
             </a:extLst>
           </p:cNvPr>
@@ -3898,7 +4173,7 @@
           </p:cNvPicPr>
           <p:nvPr/>
         </p:nvPicPr>
-        <p:blipFill>
+        <p:blipFill rotWithShape="1">
           <a:blip r:embed="rId2">
             <a:extLst>
               <a:ext uri="{28A0092B-C50C-407E-A947-70E740481C1C}">
@@ -3906,25 +4181,18 @@
               </a:ext>
             </a:extLst>
           </a:blip>
-          <a:srcRect/>
-          <a:stretch>
-            <a:fillRect/>
-          </a:stretch>
+          <a:srcRect l="25546" r="32141" b="13446"/>
+          <a:stretch/>
         </p:blipFill>
         <p:spPr bwMode="auto">
           <a:xfrm>
-            <a:off x="6062510" y="1191438"/>
-            <a:ext cx="2698623" cy="3872249"/>
-          </a:xfrm>
-          <a:prstGeom prst="rect">
-            <a:avLst/>
-          </a:prstGeom>
-          <a:ln>
-            <a:noFill/>
-          </a:ln>
-          <a:effectLst>
-            <a:softEdge rad="112500"/>
-          </a:effectLst>
+            <a:off x="1549400" y="3218828"/>
+            <a:ext cx="1803400" cy="1879595"/>
+          </a:xfrm>
+          <a:prstGeom prst="rect">
+            <a:avLst/>
+          </a:prstGeom>
+          <a:noFill/>
           <a:extLst>
             <a:ext uri="{909E8E84-426E-40DD-AFC4-6F175D3DCCD1}">
               <a14:hiddenFill xmlns:a14="http://schemas.microsoft.com/office/drawing/2010/main">
@@ -3968,128 +4236,10 @@
       </p:grpSpPr>
       <p:sp>
         <p:nvSpPr>
-          <p:cNvPr id="3" name="CuadroTexto 2">
+          <p:cNvPr id="2" name="Rectángulo 1">
             <a:extLst>
               <a:ext uri="{FF2B5EF4-FFF2-40B4-BE49-F238E27FC236}">
-                <a16:creationId xmlns:a16="http://schemas.microsoft.com/office/drawing/2014/main" id="{D26C589D-9711-4C7B-9DC8-BA36BF20BB1E}"/>
-              </a:ext>
-            </a:extLst>
-          </p:cNvPr>
-          <p:cNvSpPr txBox="1"/>
-          <p:nvPr/>
-        </p:nvSpPr>
-        <p:spPr>
-          <a:xfrm>
-            <a:off x="382867" y="249495"/>
-            <a:ext cx="5413925" cy="646331"/>
-          </a:xfrm>
-          <a:prstGeom prst="rect">
-            <a:avLst/>
-          </a:prstGeom>
-          <a:noFill/>
-        </p:spPr>
-        <p:txBody>
-          <a:bodyPr wrap="square" rtlCol="0">
-            <a:spAutoFit/>
-          </a:bodyPr>
-          <a:lstStyle/>
-          <a:p>
-            <a:r>
-              <a:rPr lang="es-ES" sz="3600" b="1" dirty="0">
-                <a:solidFill>
-                  <a:schemeClr val="bg1"/>
-                </a:solidFill>
-              </a:rPr>
-              <a:t>Alcance y Delimitación</a:t>
-            </a:r>
-          </a:p>
-        </p:txBody>
-      </p:sp>
-      <p:pic>
-        <p:nvPicPr>
-          <p:cNvPr id="12294" name="Picture 6" descr="laptop dibujo visto de arriba - Buscar con Google | Laptop dibujo,  Documentos comerciales, Administrativas">
-            <a:extLst>
-              <a:ext uri="{FF2B5EF4-FFF2-40B4-BE49-F238E27FC236}">
-                <a16:creationId xmlns:a16="http://schemas.microsoft.com/office/drawing/2014/main" id="{FDDE460A-FD66-45C8-B034-CBFE98BD7D01}"/>
-              </a:ext>
-            </a:extLst>
-          </p:cNvPr>
-          <p:cNvPicPr>
-            <a:picLocks noChangeAspect="1" noChangeArrowheads="1"/>
-          </p:cNvPicPr>
-          <p:nvPr/>
-        </p:nvPicPr>
-        <p:blipFill rotWithShape="1">
-          <a:blip r:embed="rId2">
-            <a:extLst>
-              <a:ext uri="{28A0092B-C50C-407E-A947-70E740481C1C}">
-                <a14:useLocalDpi xmlns:a14="http://schemas.microsoft.com/office/drawing/2010/main" val="0"/>
-              </a:ext>
-            </a:extLst>
-          </a:blip>
-          <a:srcRect t="-326"/>
-          <a:stretch/>
-        </p:blipFill>
-        <p:spPr bwMode="auto">
-          <a:xfrm>
-            <a:off x="138344" y="1175951"/>
-            <a:ext cx="3790435" cy="3802793"/>
-          </a:xfrm>
-          <a:prstGeom prst="rect">
-            <a:avLst/>
-          </a:prstGeom>
-          <a:ln>
-            <a:noFill/>
-          </a:ln>
-          <a:effectLst>
-            <a:softEdge rad="112500"/>
-          </a:effectLst>
-          <a:extLst>
-            <a:ext uri="{909E8E84-426E-40DD-AFC4-6F175D3DCCD1}">
-              <a14:hiddenFill xmlns:a14="http://schemas.microsoft.com/office/drawing/2010/main">
-                <a:solidFill>
-                  <a:srgbClr val="FFFFFF"/>
-                </a:solidFill>
-              </a14:hiddenFill>
-            </a:ext>
-          </a:extLst>
-        </p:spPr>
-      </p:pic>
-      <p:pic>
-        <p:nvPicPr>
-          <p:cNvPr id="6" name="Imagen 5">
-            <a:extLst>
-              <a:ext uri="{FF2B5EF4-FFF2-40B4-BE49-F238E27FC236}">
-                <a16:creationId xmlns:a16="http://schemas.microsoft.com/office/drawing/2014/main" id="{B0B766EF-F643-4B0D-951F-5B7BF01AD885}"/>
-              </a:ext>
-            </a:extLst>
-          </p:cNvPr>
-          <p:cNvPicPr>
-            <a:picLocks noChangeAspect="1"/>
-          </p:cNvPicPr>
-          <p:nvPr/>
-        </p:nvPicPr>
-        <p:blipFill rotWithShape="1">
-          <a:blip r:embed="rId3"/>
-          <a:srcRect l="26701" t="21354" r="15362" b="21716"/>
-          <a:stretch/>
-        </p:blipFill>
-        <p:spPr>
-          <a:xfrm rot="5400000">
-            <a:off x="8065918" y="4319613"/>
-            <a:ext cx="715194" cy="700942"/>
-          </a:xfrm>
-          <a:prstGeom prst="rect">
-            <a:avLst/>
-          </a:prstGeom>
-        </p:spPr>
-      </p:pic>
-      <p:sp>
-        <p:nvSpPr>
-          <p:cNvPr id="7" name="Rectángulo 6">
-            <a:extLst>
-              <a:ext uri="{FF2B5EF4-FFF2-40B4-BE49-F238E27FC236}">
-                <a16:creationId xmlns:a16="http://schemas.microsoft.com/office/drawing/2014/main" id="{7226B3A4-BBE8-457C-8996-981F4313FF3D}"/>
+                <a16:creationId xmlns:a16="http://schemas.microsoft.com/office/drawing/2014/main" id="{A8797738-30AD-430B-BF7D-238B5A96E6D1}"/>
               </a:ext>
             </a:extLst>
           </p:cNvPr>
@@ -4098,8 +4248,8 @@
         </p:nvSpPr>
         <p:spPr>
           <a:xfrm>
-            <a:off x="3875616" y="1160527"/>
-            <a:ext cx="4779286" cy="3539430"/>
+            <a:off x="181675" y="1035427"/>
+            <a:ext cx="3281192" cy="3785652"/>
           </a:xfrm>
           <a:prstGeom prst="rect">
             <a:avLst/>
@@ -4138,6 +4288,23 @@
           <a:p>
             <a:pPr algn="just"/>
             <a:r>
+              <a:rPr lang="es-ES_tradnl" sz="1600" b="1" dirty="0">
+                <a:solidFill>
+                  <a:schemeClr val="tx1">
+                    <a:lumMod val="75000"/>
+                    <a:lumOff val="25000"/>
+                  </a:schemeClr>
+                </a:solidFill>
+              </a:rPr>
+              <a:t>Tercer trimestre</a:t>
+            </a:r>
+          </a:p>
+          <a:p>
+            <a:pPr marL="285750" indent="-285750" algn="just">
+              <a:buFont typeface="Arial" panose="020B0604020202020204" pitchFamily="34" charset="0"/>
+              <a:buChar char="•"/>
+            </a:pPr>
+            <a:r>
               <a:rPr lang="es-ES_tradnl" sz="1600" dirty="0">
                 <a:solidFill>
                   <a:schemeClr val="tx1">
@@ -4146,10 +4313,175 @@
                   </a:schemeClr>
                 </a:solidFill>
               </a:rPr>
-              <a:t>En el segundo trimestre se entregara, diagrama de casos de uso, casos de uso extendido, modelo entidad relación, diccionario de datos, cronograma de actividades y presupuesto y personal</a:t>
-            </a:r>
-          </a:p>
-          <a:p>
+              <a:t>Modelo relacional</a:t>
+            </a:r>
+          </a:p>
+          <a:p>
+            <a:pPr marL="285750" indent="-285750" algn="just">
+              <a:buFont typeface="Arial" panose="020B0604020202020204" pitchFamily="34" charset="0"/>
+              <a:buChar char="•"/>
+            </a:pPr>
+            <a:r>
+              <a:rPr lang="es-ES_tradnl" sz="1600" dirty="0">
+                <a:solidFill>
+                  <a:schemeClr val="tx1">
+                    <a:lumMod val="75000"/>
+                    <a:lumOff val="25000"/>
+                  </a:schemeClr>
+                </a:solidFill>
+              </a:rPr>
+              <a:t>Diagrama de clases</a:t>
+            </a:r>
+          </a:p>
+          <a:p>
+            <a:pPr marL="285750" indent="-285750" algn="just">
+              <a:buFont typeface="Arial" panose="020B0604020202020204" pitchFamily="34" charset="0"/>
+              <a:buChar char="•"/>
+            </a:pPr>
+            <a:r>
+              <a:rPr lang="es-ES_tradnl" sz="1600" dirty="0">
+                <a:solidFill>
+                  <a:schemeClr val="tx1">
+                    <a:lumMod val="75000"/>
+                    <a:lumOff val="25000"/>
+                  </a:schemeClr>
+                </a:solidFill>
+              </a:rPr>
+              <a:t>Diagrama de distribución</a:t>
+            </a:r>
+          </a:p>
+          <a:p>
+            <a:pPr marL="285750" indent="-285750" algn="just">
+              <a:buFont typeface="Arial" panose="020B0604020202020204" pitchFamily="34" charset="0"/>
+              <a:buChar char="•"/>
+            </a:pPr>
+            <a:r>
+              <a:rPr lang="es-ES_tradnl" sz="1600" dirty="0">
+                <a:solidFill>
+                  <a:schemeClr val="tx1">
+                    <a:lumMod val="75000"/>
+                    <a:lumOff val="25000"/>
+                  </a:schemeClr>
+                </a:solidFill>
+              </a:rPr>
+              <a:t>Wireframe o mockups</a:t>
+            </a:r>
+          </a:p>
+          <a:p>
+            <a:pPr marL="285750" indent="-285750" algn="just">
+              <a:buFont typeface="Arial" panose="020B0604020202020204" pitchFamily="34" charset="0"/>
+              <a:buChar char="•"/>
+            </a:pPr>
+            <a:endParaRPr lang="es-ES_tradnl" sz="1600" dirty="0">
+              <a:solidFill>
+                <a:schemeClr val="tx1">
+                  <a:lumMod val="75000"/>
+                  <a:lumOff val="25000"/>
+                </a:schemeClr>
+              </a:solidFill>
+            </a:endParaRPr>
+          </a:p>
+          <a:p>
+            <a:pPr algn="just"/>
+            <a:r>
+              <a:rPr lang="es-ES_tradnl" sz="1600" b="1" dirty="0">
+                <a:solidFill>
+                  <a:schemeClr val="tx1">
+                    <a:lumMod val="75000"/>
+                    <a:lumOff val="25000"/>
+                  </a:schemeClr>
+                </a:solidFill>
+              </a:rPr>
+              <a:t>Cuarto trimestre</a:t>
+            </a:r>
+          </a:p>
+          <a:p>
+            <a:pPr marL="285750" indent="-285750" algn="just">
+              <a:buFont typeface="Arial" panose="020B0604020202020204" pitchFamily="34" charset="0"/>
+              <a:buChar char="•"/>
+            </a:pPr>
+            <a:r>
+              <a:rPr lang="es-ES" sz="1600" dirty="0">
+                <a:solidFill>
+                  <a:schemeClr val="tx1">
+                    <a:lumMod val="75000"/>
+                    <a:lumOff val="25000"/>
+                  </a:schemeClr>
+                </a:solidFill>
+              </a:rPr>
+              <a:t>Inventario</a:t>
+            </a:r>
+          </a:p>
+          <a:p>
+            <a:pPr marL="285750" indent="-285750" algn="just">
+              <a:buFont typeface="Arial" panose="020B0604020202020204" pitchFamily="34" charset="0"/>
+              <a:buChar char="•"/>
+            </a:pPr>
+            <a:r>
+              <a:rPr lang="es-ES" sz="1600" dirty="0">
+                <a:solidFill>
+                  <a:schemeClr val="tx1">
+                    <a:lumMod val="75000"/>
+                    <a:lumOff val="25000"/>
+                  </a:schemeClr>
+                </a:solidFill>
+              </a:rPr>
+              <a:t>Informe de Costos</a:t>
+            </a:r>
+          </a:p>
+          <a:p>
+            <a:pPr marL="285750" indent="-285750" algn="just">
+              <a:buFont typeface="Arial" panose="020B0604020202020204" pitchFamily="34" charset="0"/>
+              <a:buChar char="•"/>
+            </a:pPr>
+            <a:r>
+              <a:rPr lang="es-ES" sz="1600" dirty="0">
+                <a:solidFill>
+                  <a:schemeClr val="tx1">
+                    <a:lumMod val="75000"/>
+                    <a:lumOff val="25000"/>
+                  </a:schemeClr>
+                </a:solidFill>
+              </a:rPr>
+              <a:t>Base de Datos - DDL</a:t>
+            </a:r>
+          </a:p>
+          <a:p>
+            <a:pPr marL="285750" indent="-285750" algn="just">
+              <a:buFont typeface="Arial" panose="020B0604020202020204" pitchFamily="34" charset="0"/>
+              <a:buChar char="•"/>
+            </a:pPr>
+            <a:r>
+              <a:rPr lang="es-ES" sz="1600" dirty="0">
+                <a:solidFill>
+                  <a:schemeClr val="tx1">
+                    <a:lumMod val="75000"/>
+                    <a:lumOff val="25000"/>
+                  </a:schemeClr>
+                </a:solidFill>
+              </a:rPr>
+              <a:t>Base de Datos - DML</a:t>
+            </a:r>
+          </a:p>
+          <a:p>
+            <a:pPr marL="285750" indent="-285750" algn="just">
+              <a:buFont typeface="Arial" panose="020B0604020202020204" pitchFamily="34" charset="0"/>
+              <a:buChar char="•"/>
+            </a:pPr>
+            <a:endParaRPr lang="es-ES_tradnl" sz="1600" b="1" dirty="0">
+              <a:solidFill>
+                <a:schemeClr val="tx1">
+                  <a:lumMod val="75000"/>
+                  <a:lumOff val="25000"/>
+                </a:schemeClr>
+              </a:solidFill>
+            </a:endParaRPr>
+          </a:p>
+          <a:p>
+            <a:pPr marL="285750" indent="-285750">
+              <a:buFont typeface="Arial" panose="020B0604020202020204" pitchFamily="34" charset="0"/>
+              <a:buChar char="•"/>
+            </a:pPr>
             <a:endParaRPr lang="es-ES" sz="1600" dirty="0">
               <a:solidFill>
                 <a:schemeClr val="tx1">
@@ -4159,60 +4491,53 @@
               </a:solidFill>
             </a:endParaRPr>
           </a:p>
-          <a:p>
-            <a:r>
-              <a:rPr lang="es-ES" sz="1600" dirty="0">
-                <a:solidFill>
-                  <a:schemeClr val="tx1">
-                    <a:lumMod val="75000"/>
-                    <a:lumOff val="25000"/>
-                  </a:schemeClr>
-                </a:solidFill>
-              </a:rPr>
-              <a:t>En el tercer trimestre se entregara, modelo relacional, diagrama de distribución, y wirefire o mockups</a:t>
-            </a:r>
-          </a:p>
-          <a:p>
-            <a:endParaRPr lang="es-ES" sz="1600" dirty="0">
-              <a:solidFill>
-                <a:schemeClr val="tx1">
-                  <a:lumMod val="75000"/>
-                  <a:lumOff val="25000"/>
-                </a:schemeClr>
-              </a:solidFill>
-            </a:endParaRPr>
-          </a:p>
-          <a:p>
-            <a:r>
-              <a:rPr lang="es-ES" sz="1600" dirty="0">
-                <a:solidFill>
-                  <a:schemeClr val="tx1">
-                    <a:lumMod val="75000"/>
-                    <a:lumOff val="25000"/>
-                  </a:schemeClr>
-                </a:solidFill>
-              </a:rPr>
-              <a:t>En el cuarto trimestre se entregara, inventario, informes de costos, base de datos DDL y base de datos DML.</a:t>
-            </a:r>
-          </a:p>
-          <a:p>
-            <a:endParaRPr lang="es-ES" sz="1600" dirty="0">
-              <a:solidFill>
-                <a:schemeClr val="tx1">
-                  <a:lumMod val="75000"/>
-                  <a:lumOff val="25000"/>
-                </a:schemeClr>
-              </a:solidFill>
-            </a:endParaRPr>
-          </a:p>
-        </p:txBody>
-      </p:sp>
-      <p:sp>
-        <p:nvSpPr>
-          <p:cNvPr id="8" name="Rectángulo 7">
+        </p:txBody>
+      </p:sp>
+      <p:sp>
+        <p:nvSpPr>
+          <p:cNvPr id="3" name="CuadroTexto 2">
             <a:extLst>
               <a:ext uri="{FF2B5EF4-FFF2-40B4-BE49-F238E27FC236}">
-                <a16:creationId xmlns:a16="http://schemas.microsoft.com/office/drawing/2014/main" id="{B5E57DF7-EB01-4A6B-A1DA-DBDB01EBA7D5}"/>
+                <a16:creationId xmlns:a16="http://schemas.microsoft.com/office/drawing/2014/main" id="{D26C589D-9711-4C7B-9DC8-BA36BF20BB1E}"/>
+              </a:ext>
+            </a:extLst>
+          </p:cNvPr>
+          <p:cNvSpPr txBox="1"/>
+          <p:nvPr/>
+        </p:nvSpPr>
+        <p:spPr>
+          <a:xfrm>
+            <a:off x="382867" y="249495"/>
+            <a:ext cx="5413925" cy="646331"/>
+          </a:xfrm>
+          <a:prstGeom prst="rect">
+            <a:avLst/>
+          </a:prstGeom>
+          <a:noFill/>
+        </p:spPr>
+        <p:txBody>
+          <a:bodyPr wrap="square" rtlCol="0">
+            <a:spAutoFit/>
+          </a:bodyPr>
+          <a:lstStyle/>
+          <a:p>
+            <a:r>
+              <a:rPr lang="es-ES" sz="3600" b="1" dirty="0">
+                <a:solidFill>
+                  <a:schemeClr val="bg1"/>
+                </a:solidFill>
+              </a:rPr>
+              <a:t>Alcance y Delimitación</a:t>
+            </a:r>
+          </a:p>
+        </p:txBody>
+      </p:sp>
+      <p:sp>
+        <p:nvSpPr>
+          <p:cNvPr id="4" name="Rectángulo 3">
+            <a:extLst>
+              <a:ext uri="{FF2B5EF4-FFF2-40B4-BE49-F238E27FC236}">
+                <a16:creationId xmlns:a16="http://schemas.microsoft.com/office/drawing/2014/main" id="{353CEB60-2255-401E-8360-A6C9AED537D8}"/>
               </a:ext>
             </a:extLst>
           </p:cNvPr>
@@ -4221,7 +4546,7 @@
         </p:nvSpPr>
         <p:spPr>
           <a:xfrm>
-            <a:off x="4008570" y="1441268"/>
+            <a:off x="272801" y="1349830"/>
             <a:ext cx="718487" cy="45719"/>
           </a:xfrm>
           <a:prstGeom prst="rect">
@@ -4258,10 +4583,546 @@
           </a:p>
         </p:txBody>
       </p:sp>
+      <p:sp>
+        <p:nvSpPr>
+          <p:cNvPr id="9" name="Rectángulo 8">
+            <a:extLst>
+              <a:ext uri="{FF2B5EF4-FFF2-40B4-BE49-F238E27FC236}">
+                <a16:creationId xmlns:a16="http://schemas.microsoft.com/office/drawing/2014/main" id="{6EF37200-577B-4342-A97C-3E73FE9965D7}"/>
+              </a:ext>
+            </a:extLst>
+          </p:cNvPr>
+          <p:cNvSpPr/>
+          <p:nvPr/>
+        </p:nvSpPr>
+        <p:spPr>
+          <a:xfrm>
+            <a:off x="2782155" y="1491297"/>
+            <a:ext cx="3356179" cy="4031873"/>
+          </a:xfrm>
+          <a:prstGeom prst="rect">
+            <a:avLst/>
+          </a:prstGeom>
+        </p:spPr>
+        <p:txBody>
+          <a:bodyPr wrap="square">
+            <a:spAutoFit/>
+          </a:bodyPr>
+          <a:lstStyle/>
+          <a:p>
+            <a:pPr algn="just"/>
+            <a:r>
+              <a:rPr lang="es-ES_tradnl" sz="1600" b="1" dirty="0">
+                <a:solidFill>
+                  <a:schemeClr val="tx1">
+                    <a:lumMod val="75000"/>
+                    <a:lumOff val="25000"/>
+                  </a:schemeClr>
+                </a:solidFill>
+              </a:rPr>
+              <a:t>Quinto trimestre</a:t>
+            </a:r>
+          </a:p>
+          <a:p>
+            <a:pPr marL="285750" indent="-285750" algn="just">
+              <a:buFont typeface="Arial" panose="020B0604020202020204" pitchFamily="34" charset="0"/>
+              <a:buChar char="•"/>
+            </a:pPr>
+            <a:r>
+              <a:rPr lang="es-ES" sz="1600" dirty="0">
+                <a:solidFill>
+                  <a:schemeClr val="tx1">
+                    <a:lumMod val="75000"/>
+                    <a:lumOff val="25000"/>
+                  </a:schemeClr>
+                </a:solidFill>
+              </a:rPr>
+              <a:t>Prototipo No Funcional</a:t>
+            </a:r>
+          </a:p>
+          <a:p>
+            <a:pPr marL="285750" indent="-285750" algn="just">
+              <a:buFont typeface="Arial" panose="020B0604020202020204" pitchFamily="34" charset="0"/>
+              <a:buChar char="•"/>
+            </a:pPr>
+            <a:r>
+              <a:rPr lang="es-ES" sz="1600" dirty="0">
+                <a:solidFill>
+                  <a:schemeClr val="tx1">
+                    <a:lumMod val="75000"/>
+                    <a:lumOff val="25000"/>
+                  </a:schemeClr>
+                </a:solidFill>
+              </a:rPr>
+              <a:t>Manual Técnico</a:t>
+            </a:r>
+          </a:p>
+          <a:p>
+            <a:pPr marL="285750" indent="-285750" algn="just">
+              <a:buFont typeface="Arial" panose="020B0604020202020204" pitchFamily="34" charset="0"/>
+              <a:buChar char="•"/>
+            </a:pPr>
+            <a:r>
+              <a:rPr lang="es-ES" sz="1600" dirty="0">
+                <a:solidFill>
+                  <a:schemeClr val="tx1">
+                    <a:lumMod val="75000"/>
+                    <a:lumOff val="25000"/>
+                  </a:schemeClr>
+                </a:solidFill>
+              </a:rPr>
+              <a:t>Planeación Pruebas Software</a:t>
+            </a:r>
+          </a:p>
+          <a:p>
+            <a:pPr marL="285750" indent="-285750" algn="just">
+              <a:buFont typeface="Arial" panose="020B0604020202020204" pitchFamily="34" charset="0"/>
+              <a:buChar char="•"/>
+            </a:pPr>
+            <a:r>
+              <a:rPr lang="es-ES" sz="1600" dirty="0">
+                <a:solidFill>
+                  <a:schemeClr val="tx1">
+                    <a:lumMod val="75000"/>
+                    <a:lumOff val="25000"/>
+                  </a:schemeClr>
+                </a:solidFill>
+              </a:rPr>
+              <a:t>Local App - S.I.</a:t>
+            </a:r>
+          </a:p>
+          <a:p>
+            <a:pPr marL="285750" indent="-285750" algn="just">
+              <a:buFont typeface="Arial" panose="020B0604020202020204" pitchFamily="34" charset="0"/>
+              <a:buChar char="•"/>
+            </a:pPr>
+            <a:endParaRPr lang="es-ES_tradnl" sz="1600" b="1" dirty="0">
+              <a:solidFill>
+                <a:schemeClr val="tx1">
+                  <a:lumMod val="75000"/>
+                  <a:lumOff val="25000"/>
+                </a:schemeClr>
+              </a:solidFill>
+            </a:endParaRPr>
+          </a:p>
+          <a:p>
+            <a:pPr algn="just"/>
+            <a:r>
+              <a:rPr lang="es-ES_tradnl" sz="1600" b="1" dirty="0">
+                <a:solidFill>
+                  <a:schemeClr val="tx1">
+                    <a:lumMod val="75000"/>
+                    <a:lumOff val="25000"/>
+                  </a:schemeClr>
+                </a:solidFill>
+              </a:rPr>
+              <a:t>Sexto trimestre</a:t>
+            </a:r>
+          </a:p>
+          <a:p>
+            <a:pPr marL="285750" indent="-285750" algn="just">
+              <a:buFont typeface="Arial" panose="020B0604020202020204" pitchFamily="34" charset="0"/>
+              <a:buChar char="•"/>
+            </a:pPr>
+            <a:r>
+              <a:rPr lang="es-ES" sz="1600" dirty="0">
+                <a:solidFill>
+                  <a:schemeClr val="tx1">
+                    <a:lumMod val="75000"/>
+                    <a:lumOff val="25000"/>
+                  </a:schemeClr>
+                </a:solidFill>
+              </a:rPr>
+              <a:t>Plan de Instalación</a:t>
+            </a:r>
+          </a:p>
+          <a:p>
+            <a:pPr marL="285750" indent="-285750" algn="just">
+              <a:buFont typeface="Arial" panose="020B0604020202020204" pitchFamily="34" charset="0"/>
+              <a:buChar char="•"/>
+            </a:pPr>
+            <a:r>
+              <a:rPr lang="es-ES" sz="1600" dirty="0">
+                <a:solidFill>
+                  <a:schemeClr val="tx1">
+                    <a:lumMod val="75000"/>
+                    <a:lumOff val="25000"/>
+                  </a:schemeClr>
+                </a:solidFill>
+              </a:rPr>
+              <a:t>Plan de Respaldo</a:t>
+            </a:r>
+          </a:p>
+          <a:p>
+            <a:pPr marL="285750" indent="-285750" algn="just">
+              <a:buFont typeface="Arial" panose="020B0604020202020204" pitchFamily="34" charset="0"/>
+              <a:buChar char="•"/>
+            </a:pPr>
+            <a:r>
+              <a:rPr lang="es-ES" sz="1600" dirty="0">
+                <a:solidFill>
+                  <a:schemeClr val="tx1">
+                    <a:lumMod val="75000"/>
+                    <a:lumOff val="25000"/>
+                  </a:schemeClr>
+                </a:solidFill>
+              </a:rPr>
+              <a:t>Plan de Migración Datos</a:t>
+            </a:r>
+          </a:p>
+          <a:p>
+            <a:pPr marL="285750" indent="-285750" algn="just">
+              <a:buFont typeface="Arial" panose="020B0604020202020204" pitchFamily="34" charset="0"/>
+              <a:buChar char="•"/>
+            </a:pPr>
+            <a:r>
+              <a:rPr lang="es-ES" sz="1600" dirty="0">
+                <a:solidFill>
+                  <a:schemeClr val="tx1">
+                    <a:lumMod val="75000"/>
+                    <a:lumOff val="25000"/>
+                  </a:schemeClr>
+                </a:solidFill>
+              </a:rPr>
+              <a:t>Manual de Usuario</a:t>
+            </a:r>
+          </a:p>
+          <a:p>
+            <a:pPr marL="285750" indent="-285750" algn="just">
+              <a:buFont typeface="Arial" panose="020B0604020202020204" pitchFamily="34" charset="0"/>
+              <a:buChar char="•"/>
+            </a:pPr>
+            <a:r>
+              <a:rPr lang="es-ES" sz="1600" dirty="0">
+                <a:solidFill>
+                  <a:schemeClr val="tx1">
+                    <a:lumMod val="75000"/>
+                    <a:lumOff val="25000"/>
+                  </a:schemeClr>
+                </a:solidFill>
+              </a:rPr>
+              <a:t>Manual de Operación</a:t>
+            </a:r>
+          </a:p>
+          <a:p>
+            <a:pPr marL="285750" indent="-285750" algn="just">
+              <a:buFont typeface="Arial" panose="020B0604020202020204" pitchFamily="34" charset="0"/>
+              <a:buChar char="•"/>
+            </a:pPr>
+            <a:r>
+              <a:rPr lang="es-ES" sz="1600" dirty="0">
+                <a:solidFill>
+                  <a:schemeClr val="tx1">
+                    <a:lumMod val="75000"/>
+                    <a:lumOff val="25000"/>
+                  </a:schemeClr>
+                </a:solidFill>
+              </a:rPr>
+              <a:t>Documentación Pruebas Software</a:t>
+            </a:r>
+          </a:p>
+          <a:p>
+            <a:pPr marL="285750" indent="-285750" algn="just">
+              <a:buFont typeface="Arial" panose="020B0604020202020204" pitchFamily="34" charset="0"/>
+              <a:buChar char="•"/>
+            </a:pPr>
+            <a:r>
+              <a:rPr lang="es-ES" sz="1600" dirty="0">
+                <a:solidFill>
+                  <a:schemeClr val="tx1">
+                    <a:lumMod val="75000"/>
+                    <a:lumOff val="25000"/>
+                  </a:schemeClr>
+                </a:solidFill>
+              </a:rPr>
+              <a:t>Despliegue app - S.I. 1er</a:t>
+            </a:r>
+          </a:p>
+          <a:p>
+            <a:pPr marL="285750" indent="-285750" algn="just">
+              <a:buFont typeface="Arial" panose="020B0604020202020204" pitchFamily="34" charset="0"/>
+              <a:buChar char="•"/>
+            </a:pPr>
+            <a:endParaRPr lang="es-ES_tradnl" sz="1600" dirty="0">
+              <a:solidFill>
+                <a:schemeClr val="tx1">
+                  <a:lumMod val="75000"/>
+                  <a:lumOff val="25000"/>
+                </a:schemeClr>
+              </a:solidFill>
+            </a:endParaRPr>
+          </a:p>
+          <a:p>
+            <a:pPr marL="285750" indent="-285750">
+              <a:buFont typeface="Arial" panose="020B0604020202020204" pitchFamily="34" charset="0"/>
+              <a:buChar char="•"/>
+            </a:pPr>
+            <a:endParaRPr lang="es-ES" sz="1600" dirty="0">
+              <a:solidFill>
+                <a:schemeClr val="tx1">
+                  <a:lumMod val="75000"/>
+                  <a:lumOff val="25000"/>
+                </a:schemeClr>
+              </a:solidFill>
+            </a:endParaRPr>
+          </a:p>
+        </p:txBody>
+      </p:sp>
+      <p:sp>
+        <p:nvSpPr>
+          <p:cNvPr id="7" name="Rectángulo 6">
+            <a:extLst>
+              <a:ext uri="{FF2B5EF4-FFF2-40B4-BE49-F238E27FC236}">
+                <a16:creationId xmlns:a16="http://schemas.microsoft.com/office/drawing/2014/main" id="{F0A64E1F-D05A-4E6A-BB60-EE788F5E5BB8}"/>
+              </a:ext>
+            </a:extLst>
+          </p:cNvPr>
+          <p:cNvSpPr/>
+          <p:nvPr/>
+        </p:nvSpPr>
+        <p:spPr>
+          <a:xfrm>
+            <a:off x="6073026" y="1487699"/>
+            <a:ext cx="2889299" cy="4031873"/>
+          </a:xfrm>
+          <a:prstGeom prst="rect">
+            <a:avLst/>
+          </a:prstGeom>
+        </p:spPr>
+        <p:txBody>
+          <a:bodyPr wrap="square">
+            <a:spAutoFit/>
+          </a:bodyPr>
+          <a:lstStyle/>
+          <a:p>
+            <a:pPr algn="just"/>
+            <a:r>
+              <a:rPr lang="es-ES_tradnl" sz="1600" b="1" dirty="0">
+                <a:solidFill>
+                  <a:schemeClr val="tx1">
+                    <a:lumMod val="75000"/>
+                    <a:lumOff val="25000"/>
+                  </a:schemeClr>
+                </a:solidFill>
+              </a:rPr>
+              <a:t>Séptimo trimestre</a:t>
+            </a:r>
+          </a:p>
+          <a:p>
+            <a:pPr marL="285750" indent="-285750" algn="just">
+              <a:buFont typeface="Arial" panose="020B0604020202020204" pitchFamily="34" charset="0"/>
+              <a:buChar char="•"/>
+            </a:pPr>
+            <a:r>
+              <a:rPr lang="es-ES_tradnl" sz="1600" dirty="0">
+                <a:solidFill>
+                  <a:schemeClr val="tx1">
+                    <a:lumMod val="75000"/>
+                    <a:lumOff val="25000"/>
+                  </a:schemeClr>
+                </a:solidFill>
+              </a:rPr>
+              <a:t>Informe de Distribución</a:t>
+            </a:r>
+          </a:p>
+          <a:p>
+            <a:pPr marL="285750" indent="-285750">
+              <a:buFont typeface="Arial" panose="020B0604020202020204" pitchFamily="34" charset="0"/>
+              <a:buChar char="•"/>
+            </a:pPr>
+            <a:r>
+              <a:rPr lang="es-ES_tradnl" sz="1600" dirty="0">
+                <a:solidFill>
+                  <a:schemeClr val="tx1">
+                    <a:lumMod val="75000"/>
+                    <a:lumOff val="25000"/>
+                  </a:schemeClr>
+                </a:solidFill>
+              </a:rPr>
+              <a:t>Cuadro Comparativo Proveedores</a:t>
+            </a:r>
+          </a:p>
+          <a:p>
+            <a:pPr marL="285750" indent="-285750" algn="just">
+              <a:buFont typeface="Arial" panose="020B0604020202020204" pitchFamily="34" charset="0"/>
+              <a:buChar char="•"/>
+            </a:pPr>
+            <a:r>
+              <a:rPr lang="es-ES_tradnl" sz="1600" dirty="0">
+                <a:solidFill>
+                  <a:schemeClr val="tx1">
+                    <a:lumMod val="75000"/>
+                    <a:lumOff val="25000"/>
+                  </a:schemeClr>
+                </a:solidFill>
+              </a:rPr>
+              <a:t>Contratos de Software</a:t>
+            </a:r>
+          </a:p>
+          <a:p>
+            <a:pPr marL="285750" indent="-285750" algn="just">
+              <a:buFont typeface="Arial" panose="020B0604020202020204" pitchFamily="34" charset="0"/>
+              <a:buChar char="•"/>
+            </a:pPr>
+            <a:r>
+              <a:rPr lang="es-ES_tradnl" sz="1600" dirty="0">
+                <a:solidFill>
+                  <a:schemeClr val="tx1">
+                    <a:lumMod val="75000"/>
+                    <a:lumOff val="25000"/>
+                  </a:schemeClr>
+                </a:solidFill>
+              </a:rPr>
+              <a:t>Despliegue app - S.I. 2do</a:t>
+            </a:r>
+          </a:p>
+          <a:p>
+            <a:pPr marL="285750" indent="-285750" algn="just">
+              <a:buFont typeface="Arial" panose="020B0604020202020204" pitchFamily="34" charset="0"/>
+              <a:buChar char="•"/>
+            </a:pPr>
+            <a:endParaRPr lang="es-ES_tradnl" sz="1600" b="1" dirty="0">
+              <a:solidFill>
+                <a:schemeClr val="tx1">
+                  <a:lumMod val="75000"/>
+                  <a:lumOff val="25000"/>
+                </a:schemeClr>
+              </a:solidFill>
+            </a:endParaRPr>
+          </a:p>
+          <a:p>
+            <a:pPr algn="just"/>
+            <a:r>
+              <a:rPr lang="es-ES_tradnl" sz="1600" b="1" dirty="0">
+                <a:solidFill>
+                  <a:schemeClr val="tx1">
+                    <a:lumMod val="75000"/>
+                    <a:lumOff val="25000"/>
+                  </a:schemeClr>
+                </a:solidFill>
+              </a:rPr>
+              <a:t>octavo trimestre</a:t>
+            </a:r>
+          </a:p>
+          <a:p>
+            <a:pPr marL="285750" indent="-285750">
+              <a:buFont typeface="Arial" panose="020B0604020202020204" pitchFamily="34" charset="0"/>
+              <a:buChar char="•"/>
+            </a:pPr>
+            <a:r>
+              <a:rPr lang="es-ES_tradnl" sz="1600" dirty="0">
+                <a:solidFill>
+                  <a:schemeClr val="tx1">
+                    <a:lumMod val="75000"/>
+                    <a:lumOff val="25000"/>
+                  </a:schemeClr>
+                </a:solidFill>
+              </a:rPr>
+              <a:t>Cronograma de Actividades Final</a:t>
+            </a:r>
+          </a:p>
+          <a:p>
+            <a:pPr marL="285750" indent="-285750" algn="just">
+              <a:buFont typeface="Arial" panose="020B0604020202020204" pitchFamily="34" charset="0"/>
+              <a:buChar char="•"/>
+            </a:pPr>
+            <a:r>
+              <a:rPr lang="es-ES_tradnl" sz="1600" dirty="0">
+                <a:solidFill>
+                  <a:schemeClr val="tx1">
+                    <a:lumMod val="75000"/>
+                    <a:lumOff val="25000"/>
+                  </a:schemeClr>
+                </a:solidFill>
+              </a:rPr>
+              <a:t>Manual de Usuario Final</a:t>
+            </a:r>
+          </a:p>
+          <a:p>
+            <a:pPr marL="285750" indent="-285750" algn="just">
+              <a:buFont typeface="Arial" panose="020B0604020202020204" pitchFamily="34" charset="0"/>
+              <a:buChar char="•"/>
+            </a:pPr>
+            <a:r>
+              <a:rPr lang="es-ES_tradnl" sz="1600" dirty="0">
+                <a:solidFill>
+                  <a:schemeClr val="tx1">
+                    <a:lumMod val="75000"/>
+                    <a:lumOff val="25000"/>
+                  </a:schemeClr>
+                </a:solidFill>
+              </a:rPr>
+              <a:t>Manual de Operación Final</a:t>
+            </a:r>
+          </a:p>
+          <a:p>
+            <a:pPr marL="285750" indent="-285750" algn="just">
+              <a:buFont typeface="Arial" panose="020B0604020202020204" pitchFamily="34" charset="0"/>
+              <a:buChar char="•"/>
+            </a:pPr>
+            <a:r>
+              <a:rPr lang="es-ES_tradnl" sz="1600" dirty="0">
+                <a:solidFill>
+                  <a:schemeClr val="tx1">
+                    <a:lumMod val="75000"/>
+                    <a:lumOff val="25000"/>
+                  </a:schemeClr>
+                </a:solidFill>
+              </a:rPr>
+              <a:t>Modelo de Calidad Software</a:t>
+            </a:r>
+          </a:p>
+          <a:p>
+            <a:pPr marL="285750" indent="-285750" algn="just">
+              <a:buFont typeface="Arial" panose="020B0604020202020204" pitchFamily="34" charset="0"/>
+              <a:buChar char="•"/>
+            </a:pPr>
+            <a:r>
+              <a:rPr lang="es-ES_tradnl" sz="1600" dirty="0">
+                <a:solidFill>
+                  <a:schemeClr val="tx1">
+                    <a:lumMod val="75000"/>
+                    <a:lumOff val="25000"/>
+                  </a:schemeClr>
+                </a:solidFill>
+              </a:rPr>
+              <a:t>Despliegue app - S.I. Final</a:t>
+            </a:r>
+          </a:p>
+          <a:p>
+            <a:pPr marL="285750" indent="-285750" algn="just">
+              <a:buFont typeface="Arial" panose="020B0604020202020204" pitchFamily="34" charset="0"/>
+              <a:buChar char="•"/>
+            </a:pPr>
+            <a:endParaRPr lang="es-ES_tradnl" sz="1600" dirty="0">
+              <a:solidFill>
+                <a:schemeClr val="tx1">
+                  <a:lumMod val="75000"/>
+                  <a:lumOff val="25000"/>
+                </a:schemeClr>
+              </a:solidFill>
+            </a:endParaRPr>
+          </a:p>
+          <a:p>
+            <a:pPr marL="285750" indent="-285750">
+              <a:buFont typeface="Arial" panose="020B0604020202020204" pitchFamily="34" charset="0"/>
+              <a:buChar char="•"/>
+            </a:pPr>
+            <a:endParaRPr lang="es-ES" sz="1600" dirty="0">
+              <a:solidFill>
+                <a:schemeClr val="tx1">
+                  <a:lumMod val="75000"/>
+                  <a:lumOff val="25000"/>
+                </a:schemeClr>
+              </a:solidFill>
+            </a:endParaRPr>
+          </a:p>
+        </p:txBody>
+      </p:sp>
     </p:spTree>
     <p:extLst>
       <p:ext uri="{BB962C8B-B14F-4D97-AF65-F5344CB8AC3E}">
-        <p14:creationId xmlns:p14="http://schemas.microsoft.com/office/powerpoint/2010/main" val="3844480968"/>
+        <p14:creationId xmlns:p14="http://schemas.microsoft.com/office/powerpoint/2010/main" val="4153225868"/>
       </p:ext>
     </p:extLst>
   </p:cSld>
@@ -4290,20 +5151,127 @@
       </p:grpSpPr>
       <p:sp>
         <p:nvSpPr>
-          <p:cNvPr id="3" name="CuadroTexto 2">
-            <a:extLst>
-              <a:ext uri="{FF2B5EF4-FFF2-40B4-BE49-F238E27FC236}">
-                <a16:creationId xmlns:a16="http://schemas.microsoft.com/office/drawing/2014/main" id="{D26C589D-9711-4C7B-9DC8-BA36BF20BB1E}"/>
-              </a:ext>
-            </a:extLst>
-          </p:cNvPr>
+          <p:cNvPr id="5" name="Rectángulo 4"/>
+          <p:cNvSpPr/>
+          <p:nvPr/>
+        </p:nvSpPr>
+        <p:spPr>
+          <a:xfrm>
+            <a:off x="2286000" y="1778352"/>
+            <a:ext cx="4572000" cy="1754326"/>
+          </a:xfrm>
+          <a:prstGeom prst="rect">
+            <a:avLst/>
+          </a:prstGeom>
+          <a:noFill/>
+        </p:spPr>
+        <p:txBody>
+          <a:bodyPr anchor="ctr" anchorCtr="1">
+            <a:spAutoFit/>
+          </a:bodyPr>
+          <a:lstStyle/>
+          <a:p>
+            <a:pPr algn="ctr">
+              <a:lnSpc>
+                <a:spcPct val="120000"/>
+              </a:lnSpc>
+            </a:pPr>
+            <a:r>
+              <a:rPr lang="es-ES_tradnl" b="1" dirty="0">
+                <a:solidFill>
+                  <a:schemeClr val="tx1">
+                    <a:lumMod val="75000"/>
+                    <a:lumOff val="25000"/>
+                  </a:schemeClr>
+                </a:solidFill>
+              </a:rPr>
+              <a:t>Hipervínculo a Carpeta Drive Entregable 1</a:t>
+            </a:r>
+          </a:p>
+          <a:p>
+            <a:pPr algn="ctr">
+              <a:lnSpc>
+                <a:spcPct val="120000"/>
+              </a:lnSpc>
+            </a:pPr>
+            <a:r>
+              <a:rPr lang="es-ES_tradnl" b="1" dirty="0">
+                <a:solidFill>
+                  <a:schemeClr val="tx1">
+                    <a:lumMod val="75000"/>
+                    <a:lumOff val="25000"/>
+                  </a:schemeClr>
+                </a:solidFill>
+              </a:rPr>
+              <a:t>Hipervínculo a Carpeta Drive Entregable 2</a:t>
+            </a:r>
+          </a:p>
+          <a:p>
+            <a:pPr algn="ctr">
+              <a:lnSpc>
+                <a:spcPct val="120000"/>
+              </a:lnSpc>
+            </a:pPr>
+            <a:r>
+              <a:rPr lang="es-ES_tradnl" b="1" dirty="0">
+                <a:solidFill>
+                  <a:schemeClr val="tx1">
+                    <a:lumMod val="75000"/>
+                    <a:lumOff val="25000"/>
+                  </a:schemeClr>
+                </a:solidFill>
+              </a:rPr>
+              <a:t>Hipervínculo a Carpeta Drive Entregable 3</a:t>
+            </a:r>
+          </a:p>
+          <a:p>
+            <a:pPr algn="ctr">
+              <a:lnSpc>
+                <a:spcPct val="120000"/>
+              </a:lnSpc>
+            </a:pPr>
+            <a:r>
+              <a:rPr lang="es-ES_tradnl" b="1" dirty="0">
+                <a:solidFill>
+                  <a:schemeClr val="tx1">
+                    <a:lumMod val="75000"/>
+                    <a:lumOff val="25000"/>
+                  </a:schemeClr>
+                </a:solidFill>
+              </a:rPr>
+              <a:t>Hipervínculo a Carpeta Drive Entregable 4</a:t>
+            </a:r>
+          </a:p>
+          <a:p>
+            <a:pPr algn="ctr">
+              <a:lnSpc>
+                <a:spcPct val="120000"/>
+              </a:lnSpc>
+            </a:pPr>
+            <a:r>
+              <a:rPr lang="es-ES_tradnl" b="1" dirty="0">
+                <a:solidFill>
+                  <a:schemeClr val="tx1">
+                    <a:lumMod val="75000"/>
+                    <a:lumOff val="25000"/>
+                  </a:schemeClr>
+                </a:solidFill>
+              </a:rPr>
+              <a:t>Hipervínculo a Carpeta Drive Entregable N</a:t>
+            </a:r>
+          </a:p>
+        </p:txBody>
+      </p:sp>
+      <p:sp>
+        <p:nvSpPr>
+          <p:cNvPr id="6" name="CuadroTexto 5"/>
           <p:cNvSpPr txBox="1"/>
           <p:nvPr/>
         </p:nvSpPr>
         <p:spPr>
           <a:xfrm>
-            <a:off x="382867" y="249495"/>
-            <a:ext cx="5413925" cy="646331"/>
+            <a:off x="509443" y="303360"/>
+            <a:ext cx="4557507" cy="646331"/>
           </a:xfrm>
           <a:prstGeom prst="rect">
             <a:avLst/>
@@ -4317,158 +5285,41 @@
           <a:lstStyle/>
           <a:p>
             <a:r>
-              <a:rPr lang="es-ES" sz="3600" b="1" dirty="0">
-                <a:solidFill>
-                  <a:schemeClr val="bg1"/>
-                </a:solidFill>
-              </a:rPr>
-              <a:t>Alcance y Delimitación</a:t>
-            </a:r>
-          </a:p>
-        </p:txBody>
-      </p:sp>
-      <p:sp>
-        <p:nvSpPr>
-          <p:cNvPr id="7" name="Rectángulo 6">
-            <a:extLst>
-              <a:ext uri="{FF2B5EF4-FFF2-40B4-BE49-F238E27FC236}">
-                <a16:creationId xmlns:a16="http://schemas.microsoft.com/office/drawing/2014/main" id="{7226B3A4-BBE8-457C-8996-981F4313FF3D}"/>
-              </a:ext>
-            </a:extLst>
-          </p:cNvPr>
+              <a:rPr lang="es-ES" b="1" dirty="0">
+                <a:solidFill>
+                  <a:schemeClr val="tx1">
+                    <a:lumMod val="75000"/>
+                    <a:lumOff val="25000"/>
+                  </a:schemeClr>
+                </a:solidFill>
+              </a:rPr>
+              <a:t>Entregables Proyecto </a:t>
+            </a:r>
+          </a:p>
+          <a:p>
+            <a:r>
+              <a:rPr lang="es-ES" b="1" dirty="0">
+                <a:solidFill>
+                  <a:schemeClr val="tx1">
+                    <a:lumMod val="75000"/>
+                    <a:lumOff val="25000"/>
+                  </a:schemeClr>
+                </a:solidFill>
+              </a:rPr>
+              <a:t>Formativo por Trimestre</a:t>
+            </a:r>
+          </a:p>
+        </p:txBody>
+      </p:sp>
+      <p:sp>
+        <p:nvSpPr>
+          <p:cNvPr id="7" name="Rectángulo 6"/>
           <p:cNvSpPr/>
           <p:nvPr/>
         </p:nvSpPr>
         <p:spPr>
           <a:xfrm>
-            <a:off x="3875616" y="1160527"/>
-            <a:ext cx="4779286" cy="3785652"/>
-          </a:xfrm>
-          <a:prstGeom prst="rect">
-            <a:avLst/>
-          </a:prstGeom>
-        </p:spPr>
-        <p:txBody>
-          <a:bodyPr wrap="square">
-            <a:spAutoFit/>
-          </a:bodyPr>
-          <a:lstStyle/>
-          <a:p>
-            <a:pPr algn="just"/>
-            <a:r>
-              <a:rPr lang="es-ES_tradnl" sz="1600" b="1" dirty="0">
-                <a:solidFill>
-                  <a:schemeClr val="tx1">
-                    <a:lumMod val="75000"/>
-                    <a:lumOff val="25000"/>
-                  </a:schemeClr>
-                </a:solidFill>
-              </a:rPr>
-              <a:t>DELIMITACIÓN</a:t>
-            </a:r>
-          </a:p>
-          <a:p>
-            <a:pPr algn="just"/>
-            <a:endParaRPr lang="es-ES_tradnl" sz="1600" dirty="0">
-              <a:solidFill>
-                <a:schemeClr val="tx1">
-                  <a:lumMod val="75000"/>
-                  <a:lumOff val="25000"/>
-                </a:schemeClr>
-              </a:solidFill>
-            </a:endParaRPr>
-          </a:p>
-          <a:p>
-            <a:pPr algn="just"/>
-            <a:r>
-              <a:rPr lang="es-ES" sz="1600" dirty="0">
-                <a:solidFill>
-                  <a:schemeClr val="tx1">
-                    <a:lumMod val="75000"/>
-                    <a:lumOff val="25000"/>
-                  </a:schemeClr>
-                </a:solidFill>
-              </a:rPr>
-              <a:t>En el quinto trimestre se entregara, prototipo no funcional, manual técnico, planeación pruebas de software  y local App S.L.</a:t>
-            </a:r>
-          </a:p>
-          <a:p>
-            <a:pPr algn="just"/>
-            <a:endParaRPr lang="es-ES" sz="1600" dirty="0">
-              <a:solidFill>
-                <a:schemeClr val="tx1">
-                  <a:lumMod val="75000"/>
-                  <a:lumOff val="25000"/>
-                </a:schemeClr>
-              </a:solidFill>
-            </a:endParaRPr>
-          </a:p>
-          <a:p>
-            <a:pPr algn="just"/>
-            <a:r>
-              <a:rPr lang="es-ES" sz="1600" dirty="0">
-                <a:solidFill>
-                  <a:schemeClr val="tx1">
-                    <a:lumMod val="75000"/>
-                    <a:lumOff val="25000"/>
-                  </a:schemeClr>
-                </a:solidFill>
-              </a:rPr>
-              <a:t>En el sexto trimestre se entregara, plan de instalación, plan de respaldo, plan de migración de datos, manual de usuario, manual de operación, documentación de pruebas de software y despliegue app S.L. 1er</a:t>
-            </a:r>
-          </a:p>
-          <a:p>
-            <a:pPr algn="just"/>
-            <a:endParaRPr lang="es-ES" sz="1600" dirty="0">
-              <a:solidFill>
-                <a:schemeClr val="tx1">
-                  <a:lumMod val="75000"/>
-                  <a:lumOff val="25000"/>
-                </a:schemeClr>
-              </a:solidFill>
-            </a:endParaRPr>
-          </a:p>
-          <a:p>
-            <a:pPr algn="just"/>
-            <a:r>
-              <a:rPr lang="es-ES" sz="1600" dirty="0">
-                <a:solidFill>
-                  <a:schemeClr val="tx1">
-                    <a:lumMod val="75000"/>
-                    <a:lumOff val="25000"/>
-                  </a:schemeClr>
-                </a:solidFill>
-              </a:rPr>
-              <a:t>En el séptimo trimestre se entregara, informe de distribución, cuadro comparativo proveedores, contratos de software y despliegue app S.L. 2do</a:t>
-            </a:r>
-          </a:p>
-          <a:p>
-            <a:endParaRPr lang="es-ES" sz="1600" dirty="0">
-              <a:solidFill>
-                <a:schemeClr val="tx1">
-                  <a:lumMod val="75000"/>
-                  <a:lumOff val="25000"/>
-                </a:schemeClr>
-              </a:solidFill>
-            </a:endParaRPr>
-          </a:p>
-        </p:txBody>
-      </p:sp>
-      <p:sp>
-        <p:nvSpPr>
-          <p:cNvPr id="8" name="Rectángulo 7">
-            <a:extLst>
-              <a:ext uri="{FF2B5EF4-FFF2-40B4-BE49-F238E27FC236}">
-                <a16:creationId xmlns:a16="http://schemas.microsoft.com/office/drawing/2014/main" id="{D364B895-CB58-4B06-B0CD-3E519259BEE3}"/>
-              </a:ext>
-            </a:extLst>
-          </p:cNvPr>
-          <p:cNvSpPr/>
-          <p:nvPr/>
-        </p:nvSpPr>
-        <p:spPr>
-          <a:xfrm>
-            <a:off x="3928779" y="1441268"/>
+            <a:off x="607405" y="957918"/>
             <a:ext cx="718487" cy="45719"/>
           </a:xfrm>
           <a:prstGeom prst="rect">
@@ -4505,62 +5356,54 @@
           </a:p>
         </p:txBody>
       </p:sp>
-      <p:pic>
-        <p:nvPicPr>
-          <p:cNvPr id="4098" name="Picture 2" descr="Documentos necesarios en el Procedimiento de Admisión del alumnado para  solicitar los Servicios educativos (Comedor, Desayuno y Ayuda de Libros)  2020-21 – CEIP Santa Úrsula">
-            <a:extLst>
-              <a:ext uri="{FF2B5EF4-FFF2-40B4-BE49-F238E27FC236}">
-                <a16:creationId xmlns:a16="http://schemas.microsoft.com/office/drawing/2014/main" id="{0C3F69AF-9B71-4D90-99D0-E3C4C1EF722F}"/>
-              </a:ext>
-            </a:extLst>
+      <p:sp>
+        <p:nvSpPr>
+          <p:cNvPr id="8" name="Rectángulo 7">
+            <a:hlinkClick r:id="rId2" action="ppaction://hlinksldjump"/>
           </p:cNvPr>
-          <p:cNvPicPr>
-            <a:picLocks noChangeAspect="1" noChangeArrowheads="1"/>
-          </p:cNvPicPr>
-          <p:nvPr/>
-        </p:nvPicPr>
-        <p:blipFill>
-          <a:blip r:embed="rId2">
-            <a:extLst>
-              <a:ext uri="{28A0092B-C50C-407E-A947-70E740481C1C}">
-                <a14:useLocalDpi xmlns:a14="http://schemas.microsoft.com/office/drawing/2010/main" val="0"/>
-              </a:ext>
-            </a:extLst>
-          </a:blip>
-          <a:srcRect/>
-          <a:stretch>
-            <a:fillRect/>
-          </a:stretch>
-        </p:blipFill>
-        <p:spPr bwMode="auto">
-          <a:xfrm>
-            <a:off x="234011" y="1280674"/>
-            <a:ext cx="3454472" cy="3454472"/>
-          </a:xfrm>
-          <a:prstGeom prst="rect">
-            <a:avLst/>
-          </a:prstGeom>
+          <p:cNvSpPr/>
+          <p:nvPr/>
+        </p:nvSpPr>
+        <p:spPr>
+          <a:xfrm>
+            <a:off x="8212822" y="192947"/>
+            <a:ext cx="746620" cy="679508"/>
+          </a:xfrm>
+          <a:prstGeom prst="rect">
+            <a:avLst/>
+          </a:prstGeom>
+          <a:noFill/>
           <a:ln>
             <a:noFill/>
           </a:ln>
-          <a:effectLst>
-            <a:softEdge rad="112500"/>
-          </a:effectLst>
-          <a:extLst>
-            <a:ext uri="{909E8E84-426E-40DD-AFC4-6F175D3DCCD1}">
-              <a14:hiddenFill xmlns:a14="http://schemas.microsoft.com/office/drawing/2010/main">
-                <a:solidFill>
-                  <a:srgbClr val="FFFFFF"/>
-                </a:solidFill>
-              </a14:hiddenFill>
-            </a:ext>
-          </a:extLst>
-        </p:spPr>
-      </p:pic>
+        </p:spPr>
+        <p:style>
+          <a:lnRef idx="1">
+            <a:schemeClr val="accent1"/>
+          </a:lnRef>
+          <a:fillRef idx="3">
+            <a:schemeClr val="accent1"/>
+          </a:fillRef>
+          <a:effectRef idx="2">
+            <a:schemeClr val="accent1"/>
+          </a:effectRef>
+          <a:fontRef idx="minor">
+            <a:schemeClr val="lt1"/>
+          </a:fontRef>
+        </p:style>
+        <p:txBody>
+          <a:bodyPr rtlCol="0" anchor="ctr"/>
+          <a:lstStyle/>
+          <a:p>
+            <a:pPr algn="ctr"/>
+            <a:endParaRPr lang="es-CO"/>
+          </a:p>
+        </p:txBody>
+      </p:sp>
     </p:spTree>
     <p:extLst>
       <p:ext uri="{BB962C8B-B14F-4D97-AF65-F5344CB8AC3E}">
-        <p14:creationId xmlns:p14="http://schemas.microsoft.com/office/powerpoint/2010/main" val="3920574088"/>
+        <p14:creationId xmlns:p14="http://schemas.microsoft.com/office/powerpoint/2010/main" val="3047930190"/>
       </p:ext>
     </p:extLst>
   </p:cSld>
@@ -4589,216 +5432,24 @@
       </p:grpSpPr>
       <p:sp>
         <p:nvSpPr>
-          <p:cNvPr id="3" name="CuadroTexto 2">
-            <a:extLst>
-              <a:ext uri="{FF2B5EF4-FFF2-40B4-BE49-F238E27FC236}">
-                <a16:creationId xmlns:a16="http://schemas.microsoft.com/office/drawing/2014/main" id="{D26C589D-9711-4C7B-9DC8-BA36BF20BB1E}"/>
-              </a:ext>
-            </a:extLst>
-          </p:cNvPr>
-          <p:cNvSpPr txBox="1"/>
-          <p:nvPr/>
-        </p:nvSpPr>
-        <p:spPr>
-          <a:xfrm>
-            <a:off x="382867" y="249495"/>
-            <a:ext cx="5413925" cy="646331"/>
-          </a:xfrm>
-          <a:prstGeom prst="rect">
-            <a:avLst/>
-          </a:prstGeom>
-          <a:noFill/>
-        </p:spPr>
-        <p:txBody>
-          <a:bodyPr wrap="square" rtlCol="0">
-            <a:spAutoFit/>
-          </a:bodyPr>
-          <a:lstStyle/>
-          <a:p>
-            <a:r>
-              <a:rPr lang="es-ES" sz="3600" b="1" dirty="0">
-                <a:solidFill>
-                  <a:schemeClr val="bg1"/>
-                </a:solidFill>
-              </a:rPr>
-              <a:t>Alcance y Delimitación</a:t>
-            </a:r>
-          </a:p>
-        </p:txBody>
-      </p:sp>
-      <p:sp>
-        <p:nvSpPr>
-          <p:cNvPr id="7" name="Rectángulo 6">
-            <a:extLst>
-              <a:ext uri="{FF2B5EF4-FFF2-40B4-BE49-F238E27FC236}">
-                <a16:creationId xmlns:a16="http://schemas.microsoft.com/office/drawing/2014/main" id="{7226B3A4-BBE8-457C-8996-981F4313FF3D}"/>
-              </a:ext>
-            </a:extLst>
+          <p:cNvPr id="2" name="Rectángulo 1">
+            <a:hlinkClick r:id="rId2" action="ppaction://hlinksldjump"/>
           </p:cNvPr>
           <p:cNvSpPr/>
           <p:nvPr/>
         </p:nvSpPr>
         <p:spPr>
           <a:xfrm>
-            <a:off x="3875616" y="1160527"/>
-            <a:ext cx="4779286" cy="1569660"/>
-          </a:xfrm>
-          <a:prstGeom prst="rect">
-            <a:avLst/>
-          </a:prstGeom>
-        </p:spPr>
-        <p:txBody>
-          <a:bodyPr wrap="square">
-            <a:spAutoFit/>
-          </a:bodyPr>
-          <a:lstStyle/>
-          <a:p>
-            <a:pPr algn="just"/>
-            <a:r>
-              <a:rPr lang="es-ES_tradnl" sz="1600" b="1" dirty="0">
-                <a:solidFill>
-                  <a:schemeClr val="tx1">
-                    <a:lumMod val="75000"/>
-                    <a:lumOff val="25000"/>
-                  </a:schemeClr>
-                </a:solidFill>
-              </a:rPr>
-              <a:t>DELIMITACIÓN</a:t>
-            </a:r>
-          </a:p>
-          <a:p>
-            <a:pPr algn="just"/>
-            <a:endParaRPr lang="es-ES_tradnl" sz="1600" dirty="0">
-              <a:solidFill>
-                <a:schemeClr val="tx1">
-                  <a:lumMod val="75000"/>
-                  <a:lumOff val="25000"/>
-                </a:schemeClr>
-              </a:solidFill>
-            </a:endParaRPr>
-          </a:p>
-          <a:p>
-            <a:pPr algn="just"/>
-            <a:r>
-              <a:rPr lang="es-ES" sz="1600" dirty="0">
-                <a:solidFill>
-                  <a:schemeClr val="tx1">
-                    <a:lumMod val="75000"/>
-                    <a:lumOff val="25000"/>
-                  </a:schemeClr>
-                </a:solidFill>
-              </a:rPr>
-              <a:t>En el octavo trimestre se entregara, cronograma de actividades final, manual de usuario final, manual de operación final, modelo de calidad software y despliegue app S.L. final</a:t>
-            </a:r>
-          </a:p>
-        </p:txBody>
-      </p:sp>
-      <p:pic>
-        <p:nvPicPr>
-          <p:cNvPr id="5" name="Imagen 4">
-            <a:extLst>
-              <a:ext uri="{FF2B5EF4-FFF2-40B4-BE49-F238E27FC236}">
-                <a16:creationId xmlns:a16="http://schemas.microsoft.com/office/drawing/2014/main" id="{2CCBF61E-F3CF-4708-AC90-80E51F0C48AA}"/>
-              </a:ext>
-            </a:extLst>
-          </p:cNvPr>
-          <p:cNvPicPr>
-            <a:picLocks noChangeAspect="1"/>
-          </p:cNvPicPr>
-          <p:nvPr/>
-        </p:nvPicPr>
-        <p:blipFill rotWithShape="1">
-          <a:blip r:embed="rId2"/>
-          <a:srcRect l="26701" t="21354" r="15362" b="21716"/>
-          <a:stretch/>
-        </p:blipFill>
-        <p:spPr>
-          <a:xfrm rot="5400000">
-            <a:off x="8065918" y="4319613"/>
-            <a:ext cx="715194" cy="700942"/>
-          </a:xfrm>
-          <a:prstGeom prst="rect">
-            <a:avLst/>
-          </a:prstGeom>
-        </p:spPr>
-      </p:pic>
-      <p:pic>
-        <p:nvPicPr>
-          <p:cNvPr id="2050" name="Picture 2" descr="LOS DOCUMENTOS DE LA FARMACIA - Carbonell Farma">
-            <a:extLst>
-              <a:ext uri="{FF2B5EF4-FFF2-40B4-BE49-F238E27FC236}">
-                <a16:creationId xmlns:a16="http://schemas.microsoft.com/office/drawing/2014/main" id="{7FB4BDD9-2F8C-4BC9-B36E-171609BC7E9F}"/>
-              </a:ext>
-            </a:extLst>
-          </p:cNvPr>
-          <p:cNvPicPr>
-            <a:picLocks noChangeAspect="1" noChangeArrowheads="1"/>
-          </p:cNvPicPr>
-          <p:nvPr/>
-        </p:nvPicPr>
-        <p:blipFill rotWithShape="1">
-          <a:blip r:embed="rId3">
-            <a:extLst>
-              <a:ext uri="{28A0092B-C50C-407E-A947-70E740481C1C}">
-                <a14:useLocalDpi xmlns:a14="http://schemas.microsoft.com/office/drawing/2010/main" val="0"/>
-              </a:ext>
-            </a:extLst>
-          </a:blip>
-          <a:srcRect l="25797" r="642"/>
-          <a:stretch/>
-        </p:blipFill>
-        <p:spPr bwMode="auto">
-          <a:xfrm>
-            <a:off x="265814" y="1229390"/>
-            <a:ext cx="3448616" cy="3664615"/>
-          </a:xfrm>
-          <a:prstGeom prst="rect">
-            <a:avLst/>
-          </a:prstGeom>
+            <a:off x="3993158" y="1065401"/>
+            <a:ext cx="1174459" cy="1174459"/>
+          </a:xfrm>
+          <a:prstGeom prst="rect">
+            <a:avLst/>
+          </a:prstGeom>
+          <a:noFill/>
           <a:ln>
             <a:noFill/>
           </a:ln>
-          <a:effectLst>
-            <a:softEdge rad="112500"/>
-          </a:effectLst>
-          <a:extLst>
-            <a:ext uri="{909E8E84-426E-40DD-AFC4-6F175D3DCCD1}">
-              <a14:hiddenFill xmlns:a14="http://schemas.microsoft.com/office/drawing/2010/main">
-                <a:solidFill>
-                  <a:srgbClr val="FFFFFF"/>
-                </a:solidFill>
-              </a14:hiddenFill>
-            </a:ext>
-          </a:extLst>
-        </p:spPr>
-      </p:pic>
-      <p:sp>
-        <p:nvSpPr>
-          <p:cNvPr id="8" name="Rectángulo 7">
-            <a:extLst>
-              <a:ext uri="{FF2B5EF4-FFF2-40B4-BE49-F238E27FC236}">
-                <a16:creationId xmlns:a16="http://schemas.microsoft.com/office/drawing/2014/main" id="{B843FC47-4A69-4D61-B9BC-37F36E3DB1F2}"/>
-              </a:ext>
-            </a:extLst>
-          </p:cNvPr>
-          <p:cNvSpPr/>
-          <p:nvPr/>
-        </p:nvSpPr>
-        <p:spPr>
-          <a:xfrm>
-            <a:off x="3966039" y="1454584"/>
-            <a:ext cx="718487" cy="45719"/>
-          </a:xfrm>
-          <a:prstGeom prst="rect">
-            <a:avLst/>
-          </a:prstGeom>
-          <a:solidFill>
-            <a:srgbClr val="FF6600"/>
-          </a:solidFill>
-          <a:ln>
-            <a:noFill/>
-          </a:ln>
-          <a:effectLst/>
         </p:spPr>
         <p:style>
           <a:lnRef idx="1">
@@ -4819,14 +5470,14 @@
           <a:lstStyle/>
           <a:p>
             <a:pPr algn="ctr"/>
-            <a:endParaRPr lang="es-ES"/>
+            <a:endParaRPr lang="es-CO"/>
           </a:p>
         </p:txBody>
       </p:sp>
     </p:spTree>
     <p:extLst>
       <p:ext uri="{BB962C8B-B14F-4D97-AF65-F5344CB8AC3E}">
-        <p14:creationId xmlns:p14="http://schemas.microsoft.com/office/powerpoint/2010/main" val="514364269"/>
+        <p14:creationId xmlns:p14="http://schemas.microsoft.com/office/powerpoint/2010/main" val="3181596749"/>
       </p:ext>
     </p:extLst>
   </p:cSld>
@@ -5099,361 +5750,6 @@
 </p:sld>
 </file>
 
-<file path=ppt/slides/slide20.xml><?xml version="1.0" encoding="utf-8"?>
-<p:sld xmlns:a="http://schemas.openxmlformats.org/drawingml/2006/main" xmlns:r="http://schemas.openxmlformats.org/officeDocument/2006/relationships" xmlns:p="http://schemas.openxmlformats.org/presentationml/2006/main">
-  <p:cSld>
-    <p:spTree>
-      <p:nvGrpSpPr>
-        <p:cNvPr id="1" name=""/>
-        <p:cNvGrpSpPr/>
-        <p:nvPr/>
-      </p:nvGrpSpPr>
-      <p:grpSpPr>
-        <a:xfrm>
-          <a:off x="0" y="0"/>
-          <a:ext cx="0" cy="0"/>
-          <a:chOff x="0" y="0"/>
-          <a:chExt cx="0" cy="0"/>
-        </a:xfrm>
-      </p:grpSpPr>
-      <p:sp>
-        <p:nvSpPr>
-          <p:cNvPr id="5" name="Rectángulo 4"/>
-          <p:cNvSpPr/>
-          <p:nvPr/>
-        </p:nvSpPr>
-        <p:spPr>
-          <a:xfrm>
-            <a:off x="2286000" y="1778352"/>
-            <a:ext cx="4572000" cy="1754326"/>
-          </a:xfrm>
-          <a:prstGeom prst="rect">
-            <a:avLst/>
-          </a:prstGeom>
-          <a:noFill/>
-        </p:spPr>
-        <p:txBody>
-          <a:bodyPr anchor="ctr" anchorCtr="1">
-            <a:spAutoFit/>
-          </a:bodyPr>
-          <a:lstStyle/>
-          <a:p>
-            <a:pPr algn="ctr">
-              <a:lnSpc>
-                <a:spcPct val="120000"/>
-              </a:lnSpc>
-            </a:pPr>
-            <a:r>
-              <a:rPr lang="es-ES_tradnl" b="1" dirty="0">
-                <a:solidFill>
-                  <a:schemeClr val="tx1">
-                    <a:lumMod val="75000"/>
-                    <a:lumOff val="25000"/>
-                  </a:schemeClr>
-                </a:solidFill>
-              </a:rPr>
-              <a:t>Hipervínculo a Carpeta Drive Entregable 1</a:t>
-            </a:r>
-          </a:p>
-          <a:p>
-            <a:pPr algn="ctr">
-              <a:lnSpc>
-                <a:spcPct val="120000"/>
-              </a:lnSpc>
-            </a:pPr>
-            <a:r>
-              <a:rPr lang="es-ES_tradnl" b="1" dirty="0">
-                <a:solidFill>
-                  <a:schemeClr val="tx1">
-                    <a:lumMod val="75000"/>
-                    <a:lumOff val="25000"/>
-                  </a:schemeClr>
-                </a:solidFill>
-              </a:rPr>
-              <a:t>Hipervínculo a Carpeta Drive Entregable 2</a:t>
-            </a:r>
-          </a:p>
-          <a:p>
-            <a:pPr algn="ctr">
-              <a:lnSpc>
-                <a:spcPct val="120000"/>
-              </a:lnSpc>
-            </a:pPr>
-            <a:r>
-              <a:rPr lang="es-ES_tradnl" b="1" dirty="0">
-                <a:solidFill>
-                  <a:schemeClr val="tx1">
-                    <a:lumMod val="75000"/>
-                    <a:lumOff val="25000"/>
-                  </a:schemeClr>
-                </a:solidFill>
-              </a:rPr>
-              <a:t>Hipervínculo a Carpeta Drive Entregable 3</a:t>
-            </a:r>
-          </a:p>
-          <a:p>
-            <a:pPr algn="ctr">
-              <a:lnSpc>
-                <a:spcPct val="120000"/>
-              </a:lnSpc>
-            </a:pPr>
-            <a:r>
-              <a:rPr lang="es-ES_tradnl" b="1" dirty="0">
-                <a:solidFill>
-                  <a:schemeClr val="tx1">
-                    <a:lumMod val="75000"/>
-                    <a:lumOff val="25000"/>
-                  </a:schemeClr>
-                </a:solidFill>
-              </a:rPr>
-              <a:t>Hipervínculo a Carpeta Drive Entregable 4</a:t>
-            </a:r>
-          </a:p>
-          <a:p>
-            <a:pPr algn="ctr">
-              <a:lnSpc>
-                <a:spcPct val="120000"/>
-              </a:lnSpc>
-            </a:pPr>
-            <a:r>
-              <a:rPr lang="es-ES_tradnl" b="1" dirty="0">
-                <a:solidFill>
-                  <a:schemeClr val="tx1">
-                    <a:lumMod val="75000"/>
-                    <a:lumOff val="25000"/>
-                  </a:schemeClr>
-                </a:solidFill>
-              </a:rPr>
-              <a:t>Hipervínculo a Carpeta Drive Entregable N</a:t>
-            </a:r>
-          </a:p>
-        </p:txBody>
-      </p:sp>
-      <p:sp>
-        <p:nvSpPr>
-          <p:cNvPr id="6" name="CuadroTexto 5"/>
-          <p:cNvSpPr txBox="1"/>
-          <p:nvPr/>
-        </p:nvSpPr>
-        <p:spPr>
-          <a:xfrm>
-            <a:off x="509443" y="303360"/>
-            <a:ext cx="4557507" cy="646331"/>
-          </a:xfrm>
-          <a:prstGeom prst="rect">
-            <a:avLst/>
-          </a:prstGeom>
-          <a:noFill/>
-        </p:spPr>
-        <p:txBody>
-          <a:bodyPr wrap="square" rtlCol="0">
-            <a:spAutoFit/>
-          </a:bodyPr>
-          <a:lstStyle/>
-          <a:p>
-            <a:r>
-              <a:rPr lang="es-ES" b="1" dirty="0">
-                <a:solidFill>
-                  <a:schemeClr val="tx1">
-                    <a:lumMod val="75000"/>
-                    <a:lumOff val="25000"/>
-                  </a:schemeClr>
-                </a:solidFill>
-              </a:rPr>
-              <a:t>Entregables Proyecto </a:t>
-            </a:r>
-          </a:p>
-          <a:p>
-            <a:r>
-              <a:rPr lang="es-ES" b="1" dirty="0">
-                <a:solidFill>
-                  <a:schemeClr val="tx1">
-                    <a:lumMod val="75000"/>
-                    <a:lumOff val="25000"/>
-                  </a:schemeClr>
-                </a:solidFill>
-              </a:rPr>
-              <a:t>Formativo por Trimestre</a:t>
-            </a:r>
-          </a:p>
-        </p:txBody>
-      </p:sp>
-      <p:sp>
-        <p:nvSpPr>
-          <p:cNvPr id="7" name="Rectángulo 6"/>
-          <p:cNvSpPr/>
-          <p:nvPr/>
-        </p:nvSpPr>
-        <p:spPr>
-          <a:xfrm>
-            <a:off x="607405" y="957918"/>
-            <a:ext cx="718487" cy="45719"/>
-          </a:xfrm>
-          <a:prstGeom prst="rect">
-            <a:avLst/>
-          </a:prstGeom>
-          <a:solidFill>
-            <a:srgbClr val="FF6600"/>
-          </a:solidFill>
-          <a:ln>
-            <a:noFill/>
-          </a:ln>
-          <a:effectLst/>
-        </p:spPr>
-        <p:style>
-          <a:lnRef idx="1">
-            <a:schemeClr val="accent1"/>
-          </a:lnRef>
-          <a:fillRef idx="3">
-            <a:schemeClr val="accent1"/>
-          </a:fillRef>
-          <a:effectRef idx="2">
-            <a:schemeClr val="accent1"/>
-          </a:effectRef>
-          <a:fontRef idx="minor">
-            <a:schemeClr val="lt1"/>
-          </a:fontRef>
-        </p:style>
-        <p:txBody>
-          <a:bodyPr rtlCol="0" anchor="ctr"/>
-          <a:lstStyle/>
-          <a:p>
-            <a:pPr algn="ctr"/>
-            <a:endParaRPr lang="es-ES"/>
-          </a:p>
-        </p:txBody>
-      </p:sp>
-      <p:sp>
-        <p:nvSpPr>
-          <p:cNvPr id="8" name="Rectángulo 7">
-            <a:hlinkClick r:id="rId2" action="ppaction://hlinksldjump"/>
-          </p:cNvPr>
-          <p:cNvSpPr/>
-          <p:nvPr/>
-        </p:nvSpPr>
-        <p:spPr>
-          <a:xfrm>
-            <a:off x="8212822" y="192947"/>
-            <a:ext cx="746620" cy="679508"/>
-          </a:xfrm>
-          <a:prstGeom prst="rect">
-            <a:avLst/>
-          </a:prstGeom>
-          <a:noFill/>
-          <a:ln>
-            <a:noFill/>
-          </a:ln>
-        </p:spPr>
-        <p:style>
-          <a:lnRef idx="1">
-            <a:schemeClr val="accent1"/>
-          </a:lnRef>
-          <a:fillRef idx="3">
-            <a:schemeClr val="accent1"/>
-          </a:fillRef>
-          <a:effectRef idx="2">
-            <a:schemeClr val="accent1"/>
-          </a:effectRef>
-          <a:fontRef idx="minor">
-            <a:schemeClr val="lt1"/>
-          </a:fontRef>
-        </p:style>
-        <p:txBody>
-          <a:bodyPr rtlCol="0" anchor="ctr"/>
-          <a:lstStyle/>
-          <a:p>
-            <a:pPr algn="ctr"/>
-            <a:endParaRPr lang="es-CO"/>
-          </a:p>
-        </p:txBody>
-      </p:sp>
-    </p:spTree>
-    <p:extLst>
-      <p:ext uri="{BB962C8B-B14F-4D97-AF65-F5344CB8AC3E}">
-        <p14:creationId xmlns:p14="http://schemas.microsoft.com/office/powerpoint/2010/main" val="3047930190"/>
-      </p:ext>
-    </p:extLst>
-  </p:cSld>
-  <p:clrMapOvr>
-    <a:masterClrMapping/>
-  </p:clrMapOvr>
-</p:sld>
-</file>
-
-<file path=ppt/slides/slide21.xml><?xml version="1.0" encoding="utf-8"?>
-<p:sld xmlns:a="http://schemas.openxmlformats.org/drawingml/2006/main" xmlns:r="http://schemas.openxmlformats.org/officeDocument/2006/relationships" xmlns:p="http://schemas.openxmlformats.org/presentationml/2006/main">
-  <p:cSld>
-    <p:spTree>
-      <p:nvGrpSpPr>
-        <p:cNvPr id="1" name=""/>
-        <p:cNvGrpSpPr/>
-        <p:nvPr/>
-      </p:nvGrpSpPr>
-      <p:grpSpPr>
-        <a:xfrm>
-          <a:off x="0" y="0"/>
-          <a:ext cx="0" cy="0"/>
-          <a:chOff x="0" y="0"/>
-          <a:chExt cx="0" cy="0"/>
-        </a:xfrm>
-      </p:grpSpPr>
-      <p:sp>
-        <p:nvSpPr>
-          <p:cNvPr id="2" name="Rectángulo 1">
-            <a:hlinkClick r:id="rId2" action="ppaction://hlinksldjump"/>
-          </p:cNvPr>
-          <p:cNvSpPr/>
-          <p:nvPr/>
-        </p:nvSpPr>
-        <p:spPr>
-          <a:xfrm>
-            <a:off x="3993158" y="1065401"/>
-            <a:ext cx="1174459" cy="1174459"/>
-          </a:xfrm>
-          <a:prstGeom prst="rect">
-            <a:avLst/>
-          </a:prstGeom>
-          <a:noFill/>
-          <a:ln>
-            <a:noFill/>
-          </a:ln>
-        </p:spPr>
-        <p:style>
-          <a:lnRef idx="1">
-            <a:schemeClr val="accent1"/>
-          </a:lnRef>
-          <a:fillRef idx="3">
-            <a:schemeClr val="accent1"/>
-          </a:fillRef>
-          <a:effectRef idx="2">
-            <a:schemeClr val="accent1"/>
-          </a:effectRef>
-          <a:fontRef idx="minor">
-            <a:schemeClr val="lt1"/>
-          </a:fontRef>
-        </p:style>
-        <p:txBody>
-          <a:bodyPr rtlCol="0" anchor="ctr"/>
-          <a:lstStyle/>
-          <a:p>
-            <a:pPr algn="ctr"/>
-            <a:endParaRPr lang="es-CO"/>
-          </a:p>
-        </p:txBody>
-      </p:sp>
-    </p:spTree>
-    <p:extLst>
-      <p:ext uri="{BB962C8B-B14F-4D97-AF65-F5344CB8AC3E}">
-        <p14:creationId xmlns:p14="http://schemas.microsoft.com/office/powerpoint/2010/main" val="3181596749"/>
-      </p:ext>
-    </p:extLst>
-  </p:cSld>
-  <p:clrMapOvr>
-    <a:masterClrMapping/>
-  </p:clrMapOvr>
-</p:sld>
-</file>
-
 <file path=ppt/slides/slide3.xml><?xml version="1.0" encoding="utf-8"?>
 <p:sld xmlns:a="http://schemas.openxmlformats.org/drawingml/2006/main" xmlns:r="http://schemas.openxmlformats.org/officeDocument/2006/relationships" xmlns:p="http://schemas.openxmlformats.org/presentationml/2006/main">
   <p:cSld>
@@ -6682,8 +6978,8 @@
         </p:nvSpPr>
         <p:spPr>
           <a:xfrm>
-            <a:off x="3397103" y="1232954"/>
-            <a:ext cx="5333240" cy="1323439"/>
+            <a:off x="114369" y="1065234"/>
+            <a:ext cx="5905431" cy="1077218"/>
           </a:xfrm>
           <a:prstGeom prst="rect">
             <a:avLst/>
@@ -6751,8 +7047,8 @@
         </p:nvSpPr>
         <p:spPr>
           <a:xfrm>
-            <a:off x="3397102" y="2835176"/>
-            <a:ext cx="5455514" cy="2308324"/>
+            <a:off x="49884" y="2219364"/>
+            <a:ext cx="5961936" cy="3046988"/>
           </a:xfrm>
           <a:prstGeom prst="rect">
             <a:avLst/>
@@ -6778,10 +7074,7 @@
             </a:r>
           </a:p>
           <a:p>
-            <a:pPr marL="342900" indent="-342900" algn="just">
-              <a:buFont typeface="+mj-lt"/>
-              <a:buAutoNum type="arabicPeriod"/>
-            </a:pPr>
+            <a:pPr algn="just"/>
             <a:endParaRPr lang="es-ES_tradnl" sz="1600" dirty="0">
               <a:solidFill>
                 <a:schemeClr val="tx1">
@@ -6805,7 +7098,7 @@
                   </a:schemeClr>
                 </a:solidFill>
               </a:rPr>
-              <a:t>gestionar los usuarios de la empresa LES asesores contables para el sistema de información web(SEGI).</a:t>
+              <a:t>Gestionar los usuarios de la empresa LES asesores contables para el sistema de información web(SEGI).</a:t>
             </a:r>
           </a:p>
           <a:p>
@@ -6836,7 +7129,38 @@
                   </a:schemeClr>
                 </a:solidFill>
               </a:rPr>
-              <a:t>gestionar  las peticiones  para reportar daños y para solicitar visitas de soporte frente a objetos del inventario en la empresa LES asesores contables </a:t>
+              <a:t>Gestionar las bitácoras de perfiles de usuario  y su relación con el inventario en la empresa LES asesores contables</a:t>
+            </a:r>
+          </a:p>
+          <a:p>
+            <a:pPr marL="800100" lvl="1" indent="-342900" algn="just">
+              <a:buFont typeface="Arial" panose="020B0604020202020204" pitchFamily="34" charset="0"/>
+              <a:buChar char="•"/>
+            </a:pPr>
+            <a:endParaRPr lang="es-ES" sz="1600" dirty="0">
+              <a:solidFill>
+                <a:schemeClr val="tx1">
+                  <a:lumMod val="75000"/>
+                  <a:lumOff val="25000"/>
+                </a:schemeClr>
+              </a:solidFill>
+            </a:endParaRPr>
+          </a:p>
+          <a:p>
+            <a:pPr marL="800100" lvl="1" indent="-342900" algn="just">
+              <a:buFont typeface="Arial" panose="020B0604020202020204" pitchFamily="34" charset="0"/>
+              <a:buChar char="•"/>
+            </a:pPr>
+            <a:r>
+              <a:rPr lang="es-ES" sz="1600" dirty="0">
+                <a:solidFill>
+                  <a:schemeClr val="tx1">
+                    <a:lumMod val="75000"/>
+                    <a:lumOff val="25000"/>
+                  </a:schemeClr>
+                </a:solidFill>
+              </a:rPr>
+              <a:t>Gestionar  las peticiones  para reportar daños y para solicitar visitas de soporte frente a objetos del inventario en la empresa LES asesores contables. </a:t>
             </a:r>
             <a:endParaRPr lang="es-ES_tradnl" sz="1600" dirty="0">
               <a:solidFill>
@@ -6871,7 +7195,7 @@
         </p:nvSpPr>
         <p:spPr>
           <a:xfrm>
-            <a:off x="3496169" y="1529012"/>
+            <a:off x="207718" y="1354924"/>
             <a:ext cx="718487" cy="45719"/>
           </a:xfrm>
           <a:prstGeom prst="rect">
@@ -6916,7 +7240,7 @@
         </p:nvSpPr>
         <p:spPr>
           <a:xfrm>
-            <a:off x="3496169" y="3136326"/>
+            <a:off x="207717" y="2543662"/>
             <a:ext cx="718487" cy="45719"/>
           </a:xfrm>
           <a:prstGeom prst="rect">
@@ -7024,8 +7348,8 @@
         </p:blipFill>
         <p:spPr bwMode="auto">
           <a:xfrm>
-            <a:off x="291384" y="1352536"/>
-            <a:ext cx="2845220" cy="3359326"/>
+            <a:off x="6113149" y="1354924"/>
+            <a:ext cx="2823133" cy="3333247"/>
           </a:xfrm>
           <a:prstGeom prst="rect">
             <a:avLst/>
@@ -7184,7 +7508,7 @@
                   </a:schemeClr>
                 </a:solidFill>
               </a:rPr>
-              <a:t>gestionar el registro de los mantenimientos realizados frente a los objetos del inventario en la empresa LES asesores contables.</a:t>
+              <a:t>Gestionar el registro de los mantenimientos realizados frente a los objetos del inventario en la empresa LES asesores contables.</a:t>
             </a:r>
           </a:p>
           <a:p>
@@ -7215,7 +7539,29 @@
                   </a:schemeClr>
                 </a:solidFill>
               </a:rPr>
-              <a:t>gestionar el manejo de inventarios, con posibilidad de consultar, editar o eliminar, así como añadir un nuevo inventario para la empresa LES asesores contables.</a:t>
+              <a:t>Gestionar el manejo de inventarios, con posibilidad de consultar, editar o eliminar, así </a:t>
+            </a:r>
+            <a:r>
+              <a:rPr lang="es-ES" sz="1600" u="sng" dirty="0">
+                <a:solidFill>
+                  <a:schemeClr val="tx1">
+                    <a:lumMod val="75000"/>
+                    <a:lumOff val="25000"/>
+                  </a:schemeClr>
+                </a:solidFill>
+              </a:rPr>
+              <a:t>como</a:t>
+            </a:r>
+            <a:r>
+              <a:rPr lang="es-ES" sz="1600" dirty="0">
+                <a:solidFill>
+                  <a:schemeClr val="tx1">
+                    <a:lumMod val="75000"/>
+                    <a:lumOff val="25000"/>
+                  </a:schemeClr>
+                </a:solidFill>
+              </a:rPr>
+              <a:t> añadir un nuevo inventario para la empresa LES asesores contables.</a:t>
             </a:r>
           </a:p>
           <a:p>
@@ -7246,7 +7592,7 @@
                   </a:schemeClr>
                 </a:solidFill>
               </a:rPr>
-              <a:t>gestionar los reportes frente al tiempo de uso, mantenimientos, reporte de daños y de solicitud de soporte, personas encargadas y la consulta y edición de los inventarios en la empresa LES asesores contables.</a:t>
+              <a:t>Gestionar los reportes frente al tiempo de uso, mantenimientos, reporte de daños y de solicitud de soporte, personas encargadas y la consulta y edición de los inventarios en la empresa LES asesores contables.</a:t>
             </a:r>
             <a:endParaRPr lang="es-ES_tradnl" sz="1600" dirty="0">
               <a:solidFill>

</xml_diff>